<commit_message>
docx pptx test 2
</commit_message>
<xml_diff>
--- a/MSIM741_slides_BARBACHEM_COOGAN.pptx
+++ b/MSIM741_slides_BARBACHEM_COOGAN.pptx
@@ -3133,6 +3133,10 @@
           <a:bodyPr/>
           <a:lstStyle/>
           <a:p>
+            <a:r>
+              <a:rPr lang="en-US" smtClean="0"/>
+              <a:t>test</a:t>
+            </a:r>
             <a:endParaRPr lang="en-US"/>
           </a:p>
         </p:txBody>

</xml_diff>

<commit_message>
Added information on on the ppt.
</commit_message>
<xml_diff>
--- a/MSIM741_slides_BARBACHEM_COOGAN.pptx
+++ b/MSIM741_slides_BARBACHEM_COOGAN.pptx
@@ -7534,7 +7534,11 @@
           <a:p>
             <a:r>
               <a:rPr lang="en-US" dirty="0" smtClean="0"/>
-              <a:t>Computer-Aided Design</a:t>
+              <a:t>Computer-Aided </a:t>
+            </a:r>
+            <a:r>
+              <a:rPr lang="en-US" dirty="0" smtClean="0"/>
+              <a:t>Design (CAD)</a:t>
             </a:r>
             <a:endParaRPr lang="en-US" dirty="0"/>
           </a:p>
@@ -7825,7 +7829,48 @@
           <a:bodyPr/>
           <a:lstStyle/>
           <a:p>
-            <a:endParaRPr lang="en-US"/>
+            <a:r>
+              <a:rPr lang="en-US" dirty="0" smtClean="0"/>
+              <a:t>Ability to change the color scheme dynamically </a:t>
+            </a:r>
+          </a:p>
+          <a:p>
+            <a:endParaRPr lang="en-US" dirty="0" smtClean="0"/>
+          </a:p>
+          <a:p>
+            <a:r>
+              <a:rPr lang="en-US" dirty="0" smtClean="0"/>
+              <a:t>Ability to choose colors that are visually distinct</a:t>
+            </a:r>
+          </a:p>
+          <a:p>
+            <a:pPr lvl="1"/>
+            <a:r>
+              <a:rPr lang="en-US" dirty="0" smtClean="0"/>
+              <a:t>Certain distance apart</a:t>
+            </a:r>
+          </a:p>
+          <a:p>
+            <a:pPr lvl="1"/>
+            <a:endParaRPr lang="en-US" dirty="0" smtClean="0"/>
+          </a:p>
+          <a:p>
+            <a:r>
+              <a:rPr lang="en-US" dirty="0" smtClean="0"/>
+              <a:t>Ability to choose saturated colors</a:t>
+            </a:r>
+          </a:p>
+          <a:p>
+            <a:endParaRPr lang="en-US" dirty="0" smtClean="0"/>
+          </a:p>
+          <a:p>
+            <a:r>
+              <a:rPr lang="en-US" dirty="0" smtClean="0"/>
+              <a:t>Unambiguous data interpretation </a:t>
+            </a:r>
+          </a:p>
+          <a:p>
+            <a:endParaRPr lang="en-US" dirty="0"/>
           </a:p>
         </p:txBody>
       </p:sp>

</xml_diff>

<commit_message>
Added more information to the ppt.
</commit_message>
<xml_diff>
--- a/MSIM741_slides_BARBACHEM_COOGAN.pptx
+++ b/MSIM741_slides_BARBACHEM_COOGAN.pptx
@@ -5,7 +5,7 @@
     <p:sldMasterId id="2147483660" r:id="rId1"/>
   </p:sldMasterIdLst>
   <p:notesMasterIdLst>
-    <p:notesMasterId r:id="rId15"/>
+    <p:notesMasterId r:id="rId23"/>
   </p:notesMasterIdLst>
   <p:sldIdLst>
     <p:sldId id="256" r:id="rId2"/>
@@ -17,10 +17,18 @@
     <p:sldId id="259" r:id="rId8"/>
     <p:sldId id="260" r:id="rId9"/>
     <p:sldId id="261" r:id="rId10"/>
-    <p:sldId id="268" r:id="rId11"/>
-    <p:sldId id="262" r:id="rId12"/>
-    <p:sldId id="263" r:id="rId13"/>
-    <p:sldId id="264" r:id="rId14"/>
+    <p:sldId id="274" r:id="rId11"/>
+    <p:sldId id="275" r:id="rId12"/>
+    <p:sldId id="276" r:id="rId13"/>
+    <p:sldId id="277" r:id="rId14"/>
+    <p:sldId id="262" r:id="rId15"/>
+    <p:sldId id="269" r:id="rId16"/>
+    <p:sldId id="270" r:id="rId17"/>
+    <p:sldId id="271" r:id="rId18"/>
+    <p:sldId id="272" r:id="rId19"/>
+    <p:sldId id="273" r:id="rId20"/>
+    <p:sldId id="268" r:id="rId21"/>
+    <p:sldId id="263" r:id="rId22"/>
   </p:sldIdLst>
   <p:sldSz cx="9144000" cy="6858000" type="screen4x3"/>
   <p:notesSz cx="6858000" cy="9144000"/>
@@ -220,7 +228,7 @@
           <a:p>
             <a:fld id="{7DD70E8B-17DE-4AB4-B5F7-EE40E5D54983}" type="datetimeFigureOut">
               <a:rPr lang="en-US" smtClean="0"/>
-              <a:t>11/28/2015</a:t>
+              <a:t>11/29/2015</a:t>
             </a:fld>
             <a:endParaRPr lang="en-US"/>
           </a:p>
@@ -729,7 +737,7 @@
           <a:p>
             <a:fld id="{040382CF-E665-4BCB-92D9-2442325D20B9}" type="slidenum">
               <a:rPr lang="en-US" smtClean="0"/>
-              <a:t>11</a:t>
+              <a:t>14</a:t>
             </a:fld>
             <a:endParaRPr lang="en-US"/>
           </a:p>
@@ -934,7 +942,7 @@
           <a:p>
             <a:fld id="{EF89BEDD-2D5A-D245-9D2D-27971D6E2DCC}" type="datetimeFigureOut">
               <a:rPr lang="en-US" smtClean="0"/>
-              <a:t>11/28/2015</a:t>
+              <a:t>11/29/2015</a:t>
             </a:fld>
             <a:endParaRPr lang="en-US"/>
           </a:p>
@@ -1209,7 +1217,7 @@
           <a:p>
             <a:fld id="{EF89BEDD-2D5A-D245-9D2D-27971D6E2DCC}" type="datetimeFigureOut">
               <a:rPr lang="en-US" smtClean="0"/>
-              <a:t>11/28/2015</a:t>
+              <a:t>11/29/2015</a:t>
             </a:fld>
             <a:endParaRPr lang="en-US"/>
           </a:p>
@@ -1403,7 +1411,7 @@
           <a:p>
             <a:fld id="{EF89BEDD-2D5A-D245-9D2D-27971D6E2DCC}" type="datetimeFigureOut">
               <a:rPr lang="en-US" smtClean="0"/>
-              <a:t>11/28/2015</a:t>
+              <a:t>11/29/2015</a:t>
             </a:fld>
             <a:endParaRPr lang="en-US"/>
           </a:p>
@@ -1676,7 +1684,7 @@
           <a:p>
             <a:fld id="{EF89BEDD-2D5A-D245-9D2D-27971D6E2DCC}" type="datetimeFigureOut">
               <a:rPr lang="en-US" smtClean="0"/>
-              <a:t>11/28/2015</a:t>
+              <a:t>11/29/2015</a:t>
             </a:fld>
             <a:endParaRPr lang="en-US"/>
           </a:p>
@@ -2017,7 +2025,7 @@
           <a:p>
             <a:fld id="{EF89BEDD-2D5A-D245-9D2D-27971D6E2DCC}" type="datetimeFigureOut">
               <a:rPr lang="en-US" smtClean="0"/>
-              <a:t>11/28/2015</a:t>
+              <a:t>11/29/2015</a:t>
             </a:fld>
             <a:endParaRPr lang="en-US"/>
           </a:p>
@@ -2640,7 +2648,7 @@
           <a:p>
             <a:fld id="{EF89BEDD-2D5A-D245-9D2D-27971D6E2DCC}" type="datetimeFigureOut">
               <a:rPr lang="en-US" smtClean="0"/>
-              <a:t>11/28/2015</a:t>
+              <a:t>11/29/2015</a:t>
             </a:fld>
             <a:endParaRPr lang="en-US"/>
           </a:p>
@@ -3500,7 +3508,7 @@
           <a:p>
             <a:fld id="{EF89BEDD-2D5A-D245-9D2D-27971D6E2DCC}" type="datetimeFigureOut">
               <a:rPr lang="en-US" smtClean="0"/>
-              <a:t>11/28/2015</a:t>
+              <a:t>11/29/2015</a:t>
             </a:fld>
             <a:endParaRPr lang="en-US"/>
           </a:p>
@@ -3670,7 +3678,7 @@
           <a:p>
             <a:fld id="{EF89BEDD-2D5A-D245-9D2D-27971D6E2DCC}" type="datetimeFigureOut">
               <a:rPr lang="en-US" smtClean="0"/>
-              <a:t>11/28/2015</a:t>
+              <a:t>11/29/2015</a:t>
             </a:fld>
             <a:endParaRPr lang="en-US"/>
           </a:p>
@@ -3850,7 +3858,7 @@
           <a:p>
             <a:fld id="{EF89BEDD-2D5A-D245-9D2D-27971D6E2DCC}" type="datetimeFigureOut">
               <a:rPr lang="en-US" smtClean="0"/>
-              <a:t>11/28/2015</a:t>
+              <a:t>11/29/2015</a:t>
             </a:fld>
             <a:endParaRPr lang="en-US"/>
           </a:p>
@@ -4020,7 +4028,7 @@
           <a:p>
             <a:fld id="{EF89BEDD-2D5A-D245-9D2D-27971D6E2DCC}" type="datetimeFigureOut">
               <a:rPr lang="en-US" smtClean="0"/>
-              <a:t>11/28/2015</a:t>
+              <a:t>11/29/2015</a:t>
             </a:fld>
             <a:endParaRPr lang="en-US"/>
           </a:p>
@@ -4267,7 +4275,7 @@
           <a:p>
             <a:fld id="{EF89BEDD-2D5A-D245-9D2D-27971D6E2DCC}" type="datetimeFigureOut">
               <a:rPr lang="en-US" smtClean="0"/>
-              <a:t>11/28/2015</a:t>
+              <a:t>11/29/2015</a:t>
             </a:fld>
             <a:endParaRPr lang="en-US"/>
           </a:p>
@@ -4559,7 +4567,7 @@
           <a:p>
             <a:fld id="{EF89BEDD-2D5A-D245-9D2D-27971D6E2DCC}" type="datetimeFigureOut">
               <a:rPr lang="en-US" smtClean="0"/>
-              <a:t>11/28/2015</a:t>
+              <a:t>11/29/2015</a:t>
             </a:fld>
             <a:endParaRPr lang="en-US"/>
           </a:p>
@@ -5003,7 +5011,7 @@
           <a:p>
             <a:fld id="{EF89BEDD-2D5A-D245-9D2D-27971D6E2DCC}" type="datetimeFigureOut">
               <a:rPr lang="en-US" smtClean="0"/>
-              <a:t>11/28/2015</a:t>
+              <a:t>11/29/2015</a:t>
             </a:fld>
             <a:endParaRPr lang="en-US"/>
           </a:p>
@@ -5121,7 +5129,7 @@
           <a:p>
             <a:fld id="{EF89BEDD-2D5A-D245-9D2D-27971D6E2DCC}" type="datetimeFigureOut">
               <a:rPr lang="en-US" smtClean="0"/>
-              <a:t>11/28/2015</a:t>
+              <a:t>11/29/2015</a:t>
             </a:fld>
             <a:endParaRPr lang="en-US"/>
           </a:p>
@@ -5216,7 +5224,7 @@
           <a:p>
             <a:fld id="{EF89BEDD-2D5A-D245-9D2D-27971D6E2DCC}" type="datetimeFigureOut">
               <a:rPr lang="en-US" smtClean="0"/>
-              <a:t>11/28/2015</a:t>
+              <a:t>11/29/2015</a:t>
             </a:fld>
             <a:endParaRPr lang="en-US"/>
           </a:p>
@@ -5495,7 +5503,7 @@
           <a:p>
             <a:fld id="{EF89BEDD-2D5A-D245-9D2D-27971D6E2DCC}" type="datetimeFigureOut">
               <a:rPr lang="en-US" smtClean="0"/>
-              <a:t>11/28/2015</a:t>
+              <a:t>11/29/2015</a:t>
             </a:fld>
             <a:endParaRPr lang="en-US"/>
           </a:p>
@@ -5770,7 +5778,7 @@
           <a:p>
             <a:fld id="{EF89BEDD-2D5A-D245-9D2D-27971D6E2DCC}" type="datetimeFigureOut">
               <a:rPr lang="en-US" smtClean="0"/>
-              <a:t>11/28/2015</a:t>
+              <a:t>11/29/2015</a:t>
             </a:fld>
             <a:endParaRPr lang="en-US"/>
           </a:p>
@@ -6335,7 +6343,7 @@
           <a:p>
             <a:fld id="{EF89BEDD-2D5A-D245-9D2D-27971D6E2DCC}" type="datetimeFigureOut">
               <a:rPr lang="en-US" smtClean="0"/>
-              <a:t>11/28/2015</a:t>
+              <a:t>11/29/2015</a:t>
             </a:fld>
             <a:endParaRPr lang="en-US"/>
           </a:p>
@@ -6960,35 +6968,45 @@
           <a:p>
             <a:r>
               <a:rPr lang="en-US" dirty="0" smtClean="0"/>
-              <a:t>Demonstration</a:t>
+              <a:t>Dynamic Abilities</a:t>
             </a:r>
             <a:endParaRPr lang="en-US" dirty="0"/>
           </a:p>
         </p:txBody>
       </p:sp>
-      <p:sp>
-        <p:nvSpPr>
-          <p:cNvPr id="3" name="Content Placeholder 2"/>
-          <p:cNvSpPr>
-            <a:spLocks noGrp="1"/>
-          </p:cNvSpPr>
+      <p:pic>
+        <p:nvPicPr>
+          <p:cNvPr id="4" name="Content Placeholder 3"/>
+          <p:cNvPicPr>
+            <a:picLocks noGrp="1" noChangeAspect="1"/>
+          </p:cNvPicPr>
           <p:nvPr>
             <p:ph idx="1"/>
           </p:nvPr>
-        </p:nvSpPr>
-        <p:spPr/>
-        <p:txBody>
-          <a:bodyPr/>
-          <a:lstStyle/>
-          <a:p>
-            <a:endParaRPr lang="en-US"/>
-          </a:p>
-        </p:txBody>
-      </p:sp>
+        </p:nvPicPr>
+        <p:blipFill>
+          <a:blip r:embed="rId2">
+            <a:extLst>
+              <a:ext uri="{28A0092B-C50C-407E-A947-70E740481C1C}">
+                <a14:useLocalDpi xmlns:a14="http://schemas.microsoft.com/office/drawing/2010/main" val="0"/>
+              </a:ext>
+            </a:extLst>
+          </a:blip>
+          <a:stretch>
+            <a:fillRect/>
+          </a:stretch>
+        </p:blipFill>
+        <p:spPr>
+          <a:xfrm>
+            <a:off x="1589713" y="1658742"/>
+            <a:ext cx="5669215" cy="4821482"/>
+          </a:xfrm>
+        </p:spPr>
+      </p:pic>
     </p:spTree>
     <p:extLst>
       <p:ext uri="{BB962C8B-B14F-4D97-AF65-F5344CB8AC3E}">
-        <p14:creationId xmlns:p14="http://schemas.microsoft.com/office/powerpoint/2010/main" val="933320529"/>
+        <p14:creationId xmlns:p14="http://schemas.microsoft.com/office/powerpoint/2010/main" val="1853709623"/>
       </p:ext>
     </p:extLst>
   </p:cSld>
@@ -7032,35 +7050,45 @@
           <a:p>
             <a:r>
               <a:rPr lang="en-US" dirty="0" smtClean="0"/>
-              <a:t>Results</a:t>
+              <a:t>Random Color Selection</a:t>
             </a:r>
             <a:endParaRPr lang="en-US" dirty="0"/>
           </a:p>
         </p:txBody>
       </p:sp>
-      <p:sp>
-        <p:nvSpPr>
-          <p:cNvPr id="3" name="Content Placeholder 2"/>
-          <p:cNvSpPr>
-            <a:spLocks noGrp="1"/>
-          </p:cNvSpPr>
+      <p:pic>
+        <p:nvPicPr>
+          <p:cNvPr id="4" name="Content Placeholder 3"/>
+          <p:cNvPicPr>
+            <a:picLocks noGrp="1" noChangeAspect="1"/>
+          </p:cNvPicPr>
           <p:nvPr>
             <p:ph idx="1"/>
           </p:nvPr>
-        </p:nvSpPr>
-        <p:spPr/>
-        <p:txBody>
-          <a:bodyPr/>
-          <a:lstStyle/>
-          <a:p>
-            <a:endParaRPr lang="en-US"/>
-          </a:p>
-        </p:txBody>
-      </p:sp>
+        </p:nvPicPr>
+        <p:blipFill>
+          <a:blip r:embed="rId2">
+            <a:extLst>
+              <a:ext uri="{28A0092B-C50C-407E-A947-70E740481C1C}">
+                <a14:useLocalDpi xmlns:a14="http://schemas.microsoft.com/office/drawing/2010/main" val="0"/>
+              </a:ext>
+            </a:extLst>
+          </a:blip>
+          <a:stretch>
+            <a:fillRect/>
+          </a:stretch>
+        </p:blipFill>
+        <p:spPr>
+          <a:xfrm>
+            <a:off x="2350197" y="1518066"/>
+            <a:ext cx="4514837" cy="5013714"/>
+          </a:xfrm>
+        </p:spPr>
+      </p:pic>
     </p:spTree>
     <p:extLst>
       <p:ext uri="{BB962C8B-B14F-4D97-AF65-F5344CB8AC3E}">
-        <p14:creationId xmlns:p14="http://schemas.microsoft.com/office/powerpoint/2010/main" val="2745289611"/>
+        <p14:creationId xmlns:p14="http://schemas.microsoft.com/office/powerpoint/2010/main" val="3645460186"/>
       </p:ext>
     </p:extLst>
   </p:cSld>
@@ -7104,35 +7132,48 @@
           <a:p>
             <a:r>
               <a:rPr lang="en-US" dirty="0" smtClean="0"/>
-              <a:t>Future </a:t>
-            </a:r>
+              <a:t>Color Selection</a:t>
+            </a:r>
+            <a:br>
+              <a:rPr lang="en-US" dirty="0" smtClean="0"/>
+            </a:br>
             <a:endParaRPr lang="en-US" dirty="0"/>
           </a:p>
         </p:txBody>
       </p:sp>
-      <p:sp>
-        <p:nvSpPr>
-          <p:cNvPr id="3" name="Content Placeholder 2"/>
-          <p:cNvSpPr>
-            <a:spLocks noGrp="1"/>
-          </p:cNvSpPr>
+      <p:pic>
+        <p:nvPicPr>
+          <p:cNvPr id="4" name="Content Placeholder 3"/>
+          <p:cNvPicPr>
+            <a:picLocks noGrp="1" noChangeAspect="1"/>
+          </p:cNvPicPr>
           <p:nvPr>
             <p:ph idx="1"/>
           </p:nvPr>
-        </p:nvSpPr>
-        <p:spPr/>
-        <p:txBody>
-          <a:bodyPr/>
-          <a:lstStyle/>
-          <a:p>
-            <a:endParaRPr lang="en-US"/>
-          </a:p>
-        </p:txBody>
-      </p:sp>
+        </p:nvPicPr>
+        <p:blipFill>
+          <a:blip r:embed="rId2">
+            <a:extLst>
+              <a:ext uri="{28A0092B-C50C-407E-A947-70E740481C1C}">
+                <a14:useLocalDpi xmlns:a14="http://schemas.microsoft.com/office/drawing/2010/main" val="0"/>
+              </a:ext>
+            </a:extLst>
+          </a:blip>
+          <a:stretch>
+            <a:fillRect/>
+          </a:stretch>
+        </p:blipFill>
+        <p:spPr>
+          <a:xfrm>
+            <a:off x="1923630" y="1447728"/>
+            <a:ext cx="5039877" cy="4990224"/>
+          </a:xfrm>
+        </p:spPr>
+      </p:pic>
     </p:spTree>
     <p:extLst>
       <p:ext uri="{BB962C8B-B14F-4D97-AF65-F5344CB8AC3E}">
-        <p14:creationId xmlns:p14="http://schemas.microsoft.com/office/powerpoint/2010/main" val="2855504310"/>
+        <p14:creationId xmlns:p14="http://schemas.microsoft.com/office/powerpoint/2010/main" val="843904700"/>
       </p:ext>
     </p:extLst>
   </p:cSld>
@@ -7176,35 +7217,739 @@
           <a:p>
             <a:r>
               <a:rPr lang="en-US" dirty="0" smtClean="0"/>
-              <a:t>Conclusion</a:t>
+              <a:t>Lookup Table Creation</a:t>
             </a:r>
             <a:endParaRPr lang="en-US" dirty="0"/>
           </a:p>
         </p:txBody>
       </p:sp>
-      <p:sp>
-        <p:nvSpPr>
-          <p:cNvPr id="3" name="Content Placeholder 2"/>
-          <p:cNvSpPr>
-            <a:spLocks noGrp="1"/>
-          </p:cNvSpPr>
+      <p:pic>
+        <p:nvPicPr>
+          <p:cNvPr id="4" name="Content Placeholder 3"/>
+          <p:cNvPicPr>
+            <a:picLocks noGrp="1" noChangeAspect="1"/>
+          </p:cNvPicPr>
           <p:nvPr>
             <p:ph idx="1"/>
           </p:nvPr>
-        </p:nvSpPr>
-        <p:spPr/>
-        <p:txBody>
-          <a:bodyPr/>
-          <a:lstStyle/>
-          <a:p>
-            <a:endParaRPr lang="en-US"/>
-          </a:p>
-        </p:txBody>
-      </p:sp>
+        </p:nvPicPr>
+        <p:blipFill>
+          <a:blip r:embed="rId2">
+            <a:extLst>
+              <a:ext uri="{28A0092B-C50C-407E-A947-70E740481C1C}">
+                <a14:useLocalDpi xmlns:a14="http://schemas.microsoft.com/office/drawing/2010/main" val="0"/>
+              </a:ext>
+            </a:extLst>
+          </a:blip>
+          <a:stretch>
+            <a:fillRect/>
+          </a:stretch>
+        </p:blipFill>
+        <p:spPr>
+          <a:xfrm>
+            <a:off x="1903077" y="1630607"/>
+            <a:ext cx="5524664" cy="4844287"/>
+          </a:xfrm>
+        </p:spPr>
+      </p:pic>
     </p:spTree>
     <p:extLst>
       <p:ext uri="{BB962C8B-B14F-4D97-AF65-F5344CB8AC3E}">
-        <p14:creationId xmlns:p14="http://schemas.microsoft.com/office/powerpoint/2010/main" val="3920094783"/>
+        <p14:creationId xmlns:p14="http://schemas.microsoft.com/office/powerpoint/2010/main" val="4278744661"/>
+      </p:ext>
+    </p:extLst>
+  </p:cSld>
+  <p:clrMapOvr>
+    <a:masterClrMapping/>
+  </p:clrMapOvr>
+</p:sld>
+</file>
+
+<file path=ppt/slides/slide14.xml><?xml version="1.0" encoding="utf-8"?>
+<p:sld xmlns:a="http://schemas.openxmlformats.org/drawingml/2006/main" xmlns:r="http://schemas.openxmlformats.org/officeDocument/2006/relationships" xmlns:p="http://schemas.openxmlformats.org/presentationml/2006/main">
+  <p:cSld>
+    <p:spTree>
+      <p:nvGrpSpPr>
+        <p:cNvPr id="1" name=""/>
+        <p:cNvGrpSpPr/>
+        <p:nvPr/>
+      </p:nvGrpSpPr>
+      <p:grpSpPr>
+        <a:xfrm>
+          <a:off x="0" y="0"/>
+          <a:ext cx="0" cy="0"/>
+          <a:chOff x="0" y="0"/>
+          <a:chExt cx="0" cy="0"/>
+        </a:xfrm>
+      </p:grpSpPr>
+      <p:sp>
+        <p:nvSpPr>
+          <p:cNvPr id="2" name="Title 1"/>
+          <p:cNvSpPr>
+            <a:spLocks noGrp="1"/>
+          </p:cNvSpPr>
+          <p:nvPr>
+            <p:ph type="title"/>
+          </p:nvPr>
+        </p:nvSpPr>
+        <p:spPr>
+          <a:xfrm>
+            <a:off x="934876" y="2830158"/>
+            <a:ext cx="7055380" cy="1400530"/>
+          </a:xfrm>
+        </p:spPr>
+        <p:txBody>
+          <a:bodyPr/>
+          <a:lstStyle/>
+          <a:p>
+            <a:pPr algn="ctr"/>
+            <a:r>
+              <a:rPr lang="en-US" sz="9600" dirty="0" smtClean="0"/>
+              <a:t>Results</a:t>
+            </a:r>
+            <a:endParaRPr lang="en-US" sz="9600" dirty="0"/>
+          </a:p>
+        </p:txBody>
+      </p:sp>
+    </p:spTree>
+    <p:extLst>
+      <p:ext uri="{BB962C8B-B14F-4D97-AF65-F5344CB8AC3E}">
+        <p14:creationId xmlns:p14="http://schemas.microsoft.com/office/powerpoint/2010/main" val="2745289611"/>
+      </p:ext>
+    </p:extLst>
+  </p:cSld>
+  <p:clrMapOvr>
+    <a:masterClrMapping/>
+  </p:clrMapOvr>
+</p:sld>
+</file>
+
+<file path=ppt/slides/slide15.xml><?xml version="1.0" encoding="utf-8"?>
+<p:sld xmlns:a="http://schemas.openxmlformats.org/drawingml/2006/main" xmlns:r="http://schemas.openxmlformats.org/officeDocument/2006/relationships" xmlns:p="http://schemas.openxmlformats.org/presentationml/2006/main">
+  <p:cSld>
+    <p:spTree>
+      <p:nvGrpSpPr>
+        <p:cNvPr id="1" name=""/>
+        <p:cNvGrpSpPr/>
+        <p:nvPr/>
+      </p:nvGrpSpPr>
+      <p:grpSpPr>
+        <a:xfrm>
+          <a:off x="0" y="0"/>
+          <a:ext cx="0" cy="0"/>
+          <a:chOff x="0" y="0"/>
+          <a:chExt cx="0" cy="0"/>
+        </a:xfrm>
+      </p:grpSpPr>
+      <p:sp>
+        <p:nvSpPr>
+          <p:cNvPr id="2" name="Title 1"/>
+          <p:cNvSpPr>
+            <a:spLocks noGrp="1"/>
+          </p:cNvSpPr>
+          <p:nvPr>
+            <p:ph type="title"/>
+          </p:nvPr>
+        </p:nvSpPr>
+        <p:spPr/>
+        <p:txBody>
+          <a:bodyPr/>
+          <a:lstStyle/>
+          <a:p>
+            <a:r>
+              <a:rPr lang="en-US" dirty="0" smtClean="0"/>
+              <a:t>Normal Execution</a:t>
+            </a:r>
+            <a:endParaRPr lang="en-US" dirty="0"/>
+          </a:p>
+        </p:txBody>
+      </p:sp>
+      <p:pic>
+        <p:nvPicPr>
+          <p:cNvPr id="4" name="Content Placeholder 3"/>
+          <p:cNvPicPr>
+            <a:picLocks noGrp="1" noChangeAspect="1"/>
+          </p:cNvPicPr>
+          <p:nvPr>
+            <p:ph idx="1"/>
+          </p:nvPr>
+        </p:nvPicPr>
+        <p:blipFill>
+          <a:blip r:embed="rId2">
+            <a:extLst>
+              <a:ext uri="{28A0092B-C50C-407E-A947-70E740481C1C}">
+                <a14:useLocalDpi xmlns:a14="http://schemas.microsoft.com/office/drawing/2010/main" val="0"/>
+              </a:ext>
+            </a:extLst>
+          </a:blip>
+          <a:stretch>
+            <a:fillRect/>
+          </a:stretch>
+        </p:blipFill>
+        <p:spPr>
+          <a:xfrm>
+            <a:off x="1744394" y="1543758"/>
+            <a:ext cx="5500467" cy="4725755"/>
+          </a:xfrm>
+        </p:spPr>
+      </p:pic>
+      <p:sp>
+        <p:nvSpPr>
+          <p:cNvPr id="5" name="Oval 4"/>
+          <p:cNvSpPr/>
+          <p:nvPr/>
+        </p:nvSpPr>
+        <p:spPr>
+          <a:xfrm>
+            <a:off x="1449165" y="5650534"/>
+            <a:ext cx="1392701" cy="618979"/>
+          </a:xfrm>
+          <a:prstGeom prst="ellipse">
+            <a:avLst/>
+          </a:prstGeom>
+          <a:noFill/>
+          <a:ln w="28575"/>
+        </p:spPr>
+        <p:style>
+          <a:lnRef idx="2">
+            <a:schemeClr val="accent1">
+              <a:shade val="50000"/>
+            </a:schemeClr>
+          </a:lnRef>
+          <a:fillRef idx="1">
+            <a:schemeClr val="accent1"/>
+          </a:fillRef>
+          <a:effectRef idx="0">
+            <a:schemeClr val="accent1"/>
+          </a:effectRef>
+          <a:fontRef idx="minor">
+            <a:schemeClr val="lt1"/>
+          </a:fontRef>
+        </p:style>
+        <p:txBody>
+          <a:bodyPr rtlCol="0" anchor="ctr"/>
+          <a:lstStyle/>
+          <a:p>
+            <a:pPr algn="ctr"/>
+            <a:endParaRPr lang="en-US"/>
+          </a:p>
+        </p:txBody>
+      </p:sp>
+    </p:spTree>
+    <p:extLst>
+      <p:ext uri="{BB962C8B-B14F-4D97-AF65-F5344CB8AC3E}">
+        <p14:creationId xmlns:p14="http://schemas.microsoft.com/office/powerpoint/2010/main" val="1230212350"/>
+      </p:ext>
+    </p:extLst>
+  </p:cSld>
+  <p:clrMapOvr>
+    <a:masterClrMapping/>
+  </p:clrMapOvr>
+</p:sld>
+</file>
+
+<file path=ppt/slides/slide16.xml><?xml version="1.0" encoding="utf-8"?>
+<p:sld xmlns:a="http://schemas.openxmlformats.org/drawingml/2006/main" xmlns:r="http://schemas.openxmlformats.org/officeDocument/2006/relationships" xmlns:p="http://schemas.openxmlformats.org/presentationml/2006/main">
+  <p:cSld>
+    <p:spTree>
+      <p:nvGrpSpPr>
+        <p:cNvPr id="1" name=""/>
+        <p:cNvGrpSpPr/>
+        <p:nvPr/>
+      </p:nvGrpSpPr>
+      <p:grpSpPr>
+        <a:xfrm>
+          <a:off x="0" y="0"/>
+          <a:ext cx="0" cy="0"/>
+          <a:chOff x="0" y="0"/>
+          <a:chExt cx="0" cy="0"/>
+        </a:xfrm>
+      </p:grpSpPr>
+      <p:sp>
+        <p:nvSpPr>
+          <p:cNvPr id="2" name="Title 1"/>
+          <p:cNvSpPr>
+            <a:spLocks noGrp="1"/>
+          </p:cNvSpPr>
+          <p:nvPr>
+            <p:ph type="title"/>
+          </p:nvPr>
+        </p:nvSpPr>
+        <p:spPr>
+          <a:xfrm>
+            <a:off x="259626" y="441202"/>
+            <a:ext cx="7421333" cy="1400530"/>
+          </a:xfrm>
+        </p:spPr>
+        <p:txBody>
+          <a:bodyPr/>
+          <a:lstStyle/>
+          <a:p>
+            <a:r>
+              <a:rPr lang="en-US" dirty="0" smtClean="0"/>
+              <a:t>Short Wavelength Sensitivity</a:t>
+            </a:r>
+            <a:endParaRPr lang="en-US" dirty="0"/>
+          </a:p>
+        </p:txBody>
+      </p:sp>
+      <p:pic>
+        <p:nvPicPr>
+          <p:cNvPr id="4" name="Content Placeholder 3"/>
+          <p:cNvPicPr>
+            <a:picLocks noGrp="1" noChangeAspect="1"/>
+          </p:cNvPicPr>
+          <p:nvPr>
+            <p:ph idx="1"/>
+          </p:nvPr>
+        </p:nvPicPr>
+        <p:blipFill>
+          <a:blip r:embed="rId2">
+            <a:extLst>
+              <a:ext uri="{28A0092B-C50C-407E-A947-70E740481C1C}">
+                <a14:useLocalDpi xmlns:a14="http://schemas.microsoft.com/office/drawing/2010/main" val="0"/>
+              </a:ext>
+            </a:extLst>
+          </a:blip>
+          <a:stretch>
+            <a:fillRect/>
+          </a:stretch>
+        </p:blipFill>
+        <p:spPr>
+          <a:xfrm>
+            <a:off x="1736686" y="1447728"/>
+            <a:ext cx="5620718" cy="4820024"/>
+          </a:xfrm>
+        </p:spPr>
+      </p:pic>
+      <p:sp>
+        <p:nvSpPr>
+          <p:cNvPr id="5" name="Oval 4"/>
+          <p:cNvSpPr/>
+          <p:nvPr/>
+        </p:nvSpPr>
+        <p:spPr>
+          <a:xfrm>
+            <a:off x="1589842" y="5648773"/>
+            <a:ext cx="1392701" cy="618979"/>
+          </a:xfrm>
+          <a:prstGeom prst="ellipse">
+            <a:avLst/>
+          </a:prstGeom>
+          <a:noFill/>
+          <a:ln w="28575"/>
+        </p:spPr>
+        <p:style>
+          <a:lnRef idx="2">
+            <a:schemeClr val="accent1">
+              <a:shade val="50000"/>
+            </a:schemeClr>
+          </a:lnRef>
+          <a:fillRef idx="1">
+            <a:schemeClr val="accent1"/>
+          </a:fillRef>
+          <a:effectRef idx="0">
+            <a:schemeClr val="accent1"/>
+          </a:effectRef>
+          <a:fontRef idx="minor">
+            <a:schemeClr val="lt1"/>
+          </a:fontRef>
+        </p:style>
+        <p:txBody>
+          <a:bodyPr rtlCol="0" anchor="ctr"/>
+          <a:lstStyle/>
+          <a:p>
+            <a:pPr algn="ctr"/>
+            <a:endParaRPr lang="en-US"/>
+          </a:p>
+        </p:txBody>
+      </p:sp>
+    </p:spTree>
+    <p:extLst>
+      <p:ext uri="{BB962C8B-B14F-4D97-AF65-F5344CB8AC3E}">
+        <p14:creationId xmlns:p14="http://schemas.microsoft.com/office/powerpoint/2010/main" val="3300905034"/>
+      </p:ext>
+    </p:extLst>
+  </p:cSld>
+  <p:clrMapOvr>
+    <a:masterClrMapping/>
+  </p:clrMapOvr>
+</p:sld>
+</file>
+
+<file path=ppt/slides/slide17.xml><?xml version="1.0" encoding="utf-8"?>
+<p:sld xmlns:a="http://schemas.openxmlformats.org/drawingml/2006/main" xmlns:r="http://schemas.openxmlformats.org/officeDocument/2006/relationships" xmlns:p="http://schemas.openxmlformats.org/presentationml/2006/main">
+  <p:cSld>
+    <p:spTree>
+      <p:nvGrpSpPr>
+        <p:cNvPr id="1" name=""/>
+        <p:cNvGrpSpPr/>
+        <p:nvPr/>
+      </p:nvGrpSpPr>
+      <p:grpSpPr>
+        <a:xfrm>
+          <a:off x="0" y="0"/>
+          <a:ext cx="0" cy="0"/>
+          <a:chOff x="0" y="0"/>
+          <a:chExt cx="0" cy="0"/>
+        </a:xfrm>
+      </p:grpSpPr>
+      <p:sp>
+        <p:nvSpPr>
+          <p:cNvPr id="2" name="Title 1"/>
+          <p:cNvSpPr>
+            <a:spLocks noGrp="1"/>
+          </p:cNvSpPr>
+          <p:nvPr>
+            <p:ph type="title"/>
+          </p:nvPr>
+        </p:nvSpPr>
+        <p:spPr>
+          <a:xfrm>
+            <a:off x="140676" y="452718"/>
+            <a:ext cx="8257736" cy="1400530"/>
+          </a:xfrm>
+        </p:spPr>
+        <p:txBody>
+          <a:bodyPr/>
+          <a:lstStyle/>
+          <a:p>
+            <a:r>
+              <a:rPr lang="en-US" dirty="0" smtClean="0"/>
+              <a:t>Medium Wavelength Sensitivity</a:t>
+            </a:r>
+            <a:endParaRPr lang="en-US" dirty="0"/>
+          </a:p>
+        </p:txBody>
+      </p:sp>
+      <p:pic>
+        <p:nvPicPr>
+          <p:cNvPr id="4" name="Content Placeholder 3"/>
+          <p:cNvPicPr>
+            <a:picLocks noGrp="1" noChangeAspect="1"/>
+          </p:cNvPicPr>
+          <p:nvPr>
+            <p:ph idx="1"/>
+          </p:nvPr>
+        </p:nvPicPr>
+        <p:blipFill>
+          <a:blip r:embed="rId2">
+            <a:extLst>
+              <a:ext uri="{28A0092B-C50C-407E-A947-70E740481C1C}">
+                <a14:useLocalDpi xmlns:a14="http://schemas.microsoft.com/office/drawing/2010/main" val="0"/>
+              </a:ext>
+            </a:extLst>
+          </a:blip>
+          <a:stretch>
+            <a:fillRect/>
+          </a:stretch>
+        </p:blipFill>
+        <p:spPr>
+          <a:xfrm>
+            <a:off x="1722618" y="1516821"/>
+            <a:ext cx="5705124" cy="4892406"/>
+          </a:xfrm>
+        </p:spPr>
+      </p:pic>
+      <p:sp>
+        <p:nvSpPr>
+          <p:cNvPr id="5" name="Oval 4"/>
+          <p:cNvSpPr/>
+          <p:nvPr/>
+        </p:nvSpPr>
+        <p:spPr>
+          <a:xfrm>
+            <a:off x="1561514" y="5790248"/>
+            <a:ext cx="1674055" cy="618979"/>
+          </a:xfrm>
+          <a:prstGeom prst="ellipse">
+            <a:avLst/>
+          </a:prstGeom>
+          <a:noFill/>
+          <a:ln w="28575"/>
+        </p:spPr>
+        <p:style>
+          <a:lnRef idx="2">
+            <a:schemeClr val="accent1">
+              <a:shade val="50000"/>
+            </a:schemeClr>
+          </a:lnRef>
+          <a:fillRef idx="1">
+            <a:schemeClr val="accent1"/>
+          </a:fillRef>
+          <a:effectRef idx="0">
+            <a:schemeClr val="accent1"/>
+          </a:effectRef>
+          <a:fontRef idx="minor">
+            <a:schemeClr val="lt1"/>
+          </a:fontRef>
+        </p:style>
+        <p:txBody>
+          <a:bodyPr rtlCol="0" anchor="ctr"/>
+          <a:lstStyle/>
+          <a:p>
+            <a:pPr algn="ctr"/>
+            <a:endParaRPr lang="en-US"/>
+          </a:p>
+        </p:txBody>
+      </p:sp>
+    </p:spTree>
+    <p:extLst>
+      <p:ext uri="{BB962C8B-B14F-4D97-AF65-F5344CB8AC3E}">
+        <p14:creationId xmlns:p14="http://schemas.microsoft.com/office/powerpoint/2010/main" val="3543694371"/>
+      </p:ext>
+    </p:extLst>
+  </p:cSld>
+  <p:clrMapOvr>
+    <a:masterClrMapping/>
+  </p:clrMapOvr>
+</p:sld>
+</file>
+
+<file path=ppt/slides/slide18.xml><?xml version="1.0" encoding="utf-8"?>
+<p:sld xmlns:a="http://schemas.openxmlformats.org/drawingml/2006/main" xmlns:r="http://schemas.openxmlformats.org/officeDocument/2006/relationships" xmlns:p="http://schemas.openxmlformats.org/presentationml/2006/main">
+  <p:cSld>
+    <p:spTree>
+      <p:nvGrpSpPr>
+        <p:cNvPr id="1" name=""/>
+        <p:cNvGrpSpPr/>
+        <p:nvPr/>
+      </p:nvGrpSpPr>
+      <p:grpSpPr>
+        <a:xfrm>
+          <a:off x="0" y="0"/>
+          <a:ext cx="0" cy="0"/>
+          <a:chOff x="0" y="0"/>
+          <a:chExt cx="0" cy="0"/>
+        </a:xfrm>
+      </p:grpSpPr>
+      <p:sp>
+        <p:nvSpPr>
+          <p:cNvPr id="2" name="Title 1"/>
+          <p:cNvSpPr>
+            <a:spLocks noGrp="1"/>
+          </p:cNvSpPr>
+          <p:nvPr>
+            <p:ph type="title"/>
+          </p:nvPr>
+        </p:nvSpPr>
+        <p:spPr>
+          <a:xfrm>
+            <a:off x="295422" y="452718"/>
+            <a:ext cx="7371470" cy="1400530"/>
+          </a:xfrm>
+        </p:spPr>
+        <p:txBody>
+          <a:bodyPr/>
+          <a:lstStyle/>
+          <a:p>
+            <a:r>
+              <a:rPr lang="en-US" dirty="0" smtClean="0"/>
+              <a:t>Long Wavelength Sensitivity</a:t>
+            </a:r>
+            <a:endParaRPr lang="en-US" dirty="0"/>
+          </a:p>
+        </p:txBody>
+      </p:sp>
+      <p:pic>
+        <p:nvPicPr>
+          <p:cNvPr id="4" name="Content Placeholder 3"/>
+          <p:cNvPicPr>
+            <a:picLocks noGrp="1" noChangeAspect="1"/>
+          </p:cNvPicPr>
+          <p:nvPr>
+            <p:ph idx="1"/>
+          </p:nvPr>
+        </p:nvPicPr>
+        <p:blipFill>
+          <a:blip r:embed="rId2">
+            <a:extLst>
+              <a:ext uri="{28A0092B-C50C-407E-A947-70E740481C1C}">
+                <a14:useLocalDpi xmlns:a14="http://schemas.microsoft.com/office/drawing/2010/main" val="0"/>
+              </a:ext>
+            </a:extLst>
+          </a:blip>
+          <a:stretch>
+            <a:fillRect/>
+          </a:stretch>
+        </p:blipFill>
+        <p:spPr>
+          <a:xfrm>
+            <a:off x="1669229" y="1461794"/>
+            <a:ext cx="5660039" cy="4859468"/>
+          </a:xfrm>
+        </p:spPr>
+      </p:pic>
+      <p:sp>
+        <p:nvSpPr>
+          <p:cNvPr id="5" name="Oval 4"/>
+          <p:cNvSpPr/>
+          <p:nvPr/>
+        </p:nvSpPr>
+        <p:spPr>
+          <a:xfrm>
+            <a:off x="1547639" y="5697605"/>
+            <a:ext cx="1392701" cy="618979"/>
+          </a:xfrm>
+          <a:prstGeom prst="ellipse">
+            <a:avLst/>
+          </a:prstGeom>
+          <a:noFill/>
+          <a:ln w="28575"/>
+        </p:spPr>
+        <p:style>
+          <a:lnRef idx="2">
+            <a:schemeClr val="accent1">
+              <a:shade val="50000"/>
+            </a:schemeClr>
+          </a:lnRef>
+          <a:fillRef idx="1">
+            <a:schemeClr val="accent1"/>
+          </a:fillRef>
+          <a:effectRef idx="0">
+            <a:schemeClr val="accent1"/>
+          </a:effectRef>
+          <a:fontRef idx="minor">
+            <a:schemeClr val="lt1"/>
+          </a:fontRef>
+        </p:style>
+        <p:txBody>
+          <a:bodyPr rtlCol="0" anchor="ctr"/>
+          <a:lstStyle/>
+          <a:p>
+            <a:pPr algn="ctr"/>
+            <a:endParaRPr lang="en-US"/>
+          </a:p>
+        </p:txBody>
+      </p:sp>
+    </p:spTree>
+    <p:extLst>
+      <p:ext uri="{BB962C8B-B14F-4D97-AF65-F5344CB8AC3E}">
+        <p14:creationId xmlns:p14="http://schemas.microsoft.com/office/powerpoint/2010/main" val="3048631153"/>
+      </p:ext>
+    </p:extLst>
+  </p:cSld>
+  <p:clrMapOvr>
+    <a:masterClrMapping/>
+  </p:clrMapOvr>
+</p:sld>
+</file>
+
+<file path=ppt/slides/slide19.xml><?xml version="1.0" encoding="utf-8"?>
+<p:sld xmlns:a="http://schemas.openxmlformats.org/drawingml/2006/main" xmlns:r="http://schemas.openxmlformats.org/officeDocument/2006/relationships" xmlns:p="http://schemas.openxmlformats.org/presentationml/2006/main">
+  <p:cSld>
+    <p:spTree>
+      <p:nvGrpSpPr>
+        <p:cNvPr id="1" name=""/>
+        <p:cNvGrpSpPr/>
+        <p:nvPr/>
+      </p:nvGrpSpPr>
+      <p:grpSpPr>
+        <a:xfrm>
+          <a:off x="0" y="0"/>
+          <a:ext cx="0" cy="0"/>
+          <a:chOff x="0" y="0"/>
+          <a:chExt cx="0" cy="0"/>
+        </a:xfrm>
+      </p:grpSpPr>
+      <p:sp>
+        <p:nvSpPr>
+          <p:cNvPr id="2" name="Title 1"/>
+          <p:cNvSpPr>
+            <a:spLocks noGrp="1"/>
+          </p:cNvSpPr>
+          <p:nvPr>
+            <p:ph type="title"/>
+          </p:nvPr>
+        </p:nvSpPr>
+        <p:spPr/>
+        <p:txBody>
+          <a:bodyPr/>
+          <a:lstStyle/>
+          <a:p>
+            <a:r>
+              <a:rPr lang="en-US" dirty="0" smtClean="0"/>
+              <a:t>Completely Colorblind</a:t>
+            </a:r>
+            <a:endParaRPr lang="en-US" dirty="0"/>
+          </a:p>
+        </p:txBody>
+      </p:sp>
+      <p:pic>
+        <p:nvPicPr>
+          <p:cNvPr id="4" name="Content Placeholder 3"/>
+          <p:cNvPicPr>
+            <a:picLocks noGrp="1" noChangeAspect="1"/>
+          </p:cNvPicPr>
+          <p:nvPr>
+            <p:ph idx="1"/>
+          </p:nvPr>
+        </p:nvPicPr>
+        <p:blipFill>
+          <a:blip r:embed="rId2">
+            <a:extLst>
+              <a:ext uri="{28A0092B-C50C-407E-A947-70E740481C1C}">
+                <a14:useLocalDpi xmlns:a14="http://schemas.microsoft.com/office/drawing/2010/main" val="0"/>
+              </a:ext>
+            </a:extLst>
+          </a:blip>
+          <a:stretch>
+            <a:fillRect/>
+          </a:stretch>
+        </p:blipFill>
+        <p:spPr>
+          <a:xfrm>
+            <a:off x="1734076" y="1475862"/>
+            <a:ext cx="5595191" cy="4820716"/>
+          </a:xfrm>
+        </p:spPr>
+      </p:pic>
+      <p:sp>
+        <p:nvSpPr>
+          <p:cNvPr id="5" name="Oval 4"/>
+          <p:cNvSpPr/>
+          <p:nvPr/>
+        </p:nvSpPr>
+        <p:spPr>
+          <a:xfrm>
+            <a:off x="1449165" y="5650534"/>
+            <a:ext cx="1392701" cy="618979"/>
+          </a:xfrm>
+          <a:prstGeom prst="ellipse">
+            <a:avLst/>
+          </a:prstGeom>
+          <a:noFill/>
+          <a:ln w="28575"/>
+        </p:spPr>
+        <p:style>
+          <a:lnRef idx="2">
+            <a:schemeClr val="accent1">
+              <a:shade val="50000"/>
+            </a:schemeClr>
+          </a:lnRef>
+          <a:fillRef idx="1">
+            <a:schemeClr val="accent1"/>
+          </a:fillRef>
+          <a:effectRef idx="0">
+            <a:schemeClr val="accent1"/>
+          </a:effectRef>
+          <a:fontRef idx="minor">
+            <a:schemeClr val="lt1"/>
+          </a:fontRef>
+        </p:style>
+        <p:txBody>
+          <a:bodyPr rtlCol="0" anchor="ctr"/>
+          <a:lstStyle/>
+          <a:p>
+            <a:pPr algn="ctr"/>
+            <a:endParaRPr lang="en-US"/>
+          </a:p>
+        </p:txBody>
+      </p:sp>
+    </p:spTree>
+    <p:extLst>
+      <p:ext uri="{BB962C8B-B14F-4D97-AF65-F5344CB8AC3E}">
+        <p14:creationId xmlns:p14="http://schemas.microsoft.com/office/powerpoint/2010/main" val="1642200300"/>
       </p:ext>
     </p:extLst>
   </p:cSld>
@@ -7299,6 +8044,169 @@
     <p:extLst>
       <p:ext uri="{BB962C8B-B14F-4D97-AF65-F5344CB8AC3E}">
         <p14:creationId xmlns:p14="http://schemas.microsoft.com/office/powerpoint/2010/main" val="2176792710"/>
+      </p:ext>
+    </p:extLst>
+  </p:cSld>
+  <p:clrMapOvr>
+    <a:masterClrMapping/>
+  </p:clrMapOvr>
+</p:sld>
+</file>
+
+<file path=ppt/slides/slide20.xml><?xml version="1.0" encoding="utf-8"?>
+<p:sld xmlns:a="http://schemas.openxmlformats.org/drawingml/2006/main" xmlns:r="http://schemas.openxmlformats.org/officeDocument/2006/relationships" xmlns:p="http://schemas.openxmlformats.org/presentationml/2006/main">
+  <p:cSld>
+    <p:spTree>
+      <p:nvGrpSpPr>
+        <p:cNvPr id="1" name=""/>
+        <p:cNvGrpSpPr/>
+        <p:nvPr/>
+      </p:nvGrpSpPr>
+      <p:grpSpPr>
+        <a:xfrm>
+          <a:off x="0" y="0"/>
+          <a:ext cx="0" cy="0"/>
+          <a:chOff x="0" y="0"/>
+          <a:chExt cx="0" cy="0"/>
+        </a:xfrm>
+      </p:grpSpPr>
+      <p:sp>
+        <p:nvSpPr>
+          <p:cNvPr id="2" name="Title 1"/>
+          <p:cNvSpPr>
+            <a:spLocks noGrp="1"/>
+          </p:cNvSpPr>
+          <p:nvPr>
+            <p:ph type="title"/>
+          </p:nvPr>
+        </p:nvSpPr>
+        <p:spPr>
+          <a:xfrm>
+            <a:off x="759656" y="2717616"/>
+            <a:ext cx="7469752" cy="1400530"/>
+          </a:xfrm>
+        </p:spPr>
+        <p:txBody>
+          <a:bodyPr/>
+          <a:lstStyle/>
+          <a:p>
+            <a:pPr algn="ctr"/>
+            <a:r>
+              <a:rPr lang="en-US" sz="8000" dirty="0" smtClean="0"/>
+              <a:t>Demonstration</a:t>
+            </a:r>
+            <a:endParaRPr lang="en-US" sz="8000" dirty="0"/>
+          </a:p>
+        </p:txBody>
+      </p:sp>
+    </p:spTree>
+    <p:extLst>
+      <p:ext uri="{BB962C8B-B14F-4D97-AF65-F5344CB8AC3E}">
+        <p14:creationId xmlns:p14="http://schemas.microsoft.com/office/powerpoint/2010/main" val="933320529"/>
+      </p:ext>
+    </p:extLst>
+  </p:cSld>
+  <p:clrMapOvr>
+    <a:masterClrMapping/>
+  </p:clrMapOvr>
+</p:sld>
+</file>
+
+<file path=ppt/slides/slide21.xml><?xml version="1.0" encoding="utf-8"?>
+<p:sld xmlns:a="http://schemas.openxmlformats.org/drawingml/2006/main" xmlns:r="http://schemas.openxmlformats.org/officeDocument/2006/relationships" xmlns:p="http://schemas.openxmlformats.org/presentationml/2006/main">
+  <p:cSld>
+    <p:spTree>
+      <p:nvGrpSpPr>
+        <p:cNvPr id="1" name=""/>
+        <p:cNvGrpSpPr/>
+        <p:nvPr/>
+      </p:nvGrpSpPr>
+      <p:grpSpPr>
+        <a:xfrm>
+          <a:off x="0" y="0"/>
+          <a:ext cx="0" cy="0"/>
+          <a:chOff x="0" y="0"/>
+          <a:chExt cx="0" cy="0"/>
+        </a:xfrm>
+      </p:grpSpPr>
+      <p:sp>
+        <p:nvSpPr>
+          <p:cNvPr id="2" name="Title 1"/>
+          <p:cNvSpPr>
+            <a:spLocks noGrp="1"/>
+          </p:cNvSpPr>
+          <p:nvPr>
+            <p:ph type="title"/>
+          </p:nvPr>
+        </p:nvSpPr>
+        <p:spPr/>
+        <p:txBody>
+          <a:bodyPr/>
+          <a:lstStyle/>
+          <a:p>
+            <a:r>
+              <a:rPr lang="en-US" dirty="0" smtClean="0"/>
+              <a:t>Future </a:t>
+            </a:r>
+            <a:endParaRPr lang="en-US" dirty="0"/>
+          </a:p>
+        </p:txBody>
+      </p:sp>
+      <p:sp>
+        <p:nvSpPr>
+          <p:cNvPr id="3" name="Content Placeholder 2"/>
+          <p:cNvSpPr>
+            <a:spLocks noGrp="1"/>
+          </p:cNvSpPr>
+          <p:nvPr>
+            <p:ph idx="1"/>
+          </p:nvPr>
+        </p:nvSpPr>
+        <p:spPr/>
+        <p:txBody>
+          <a:bodyPr/>
+          <a:lstStyle/>
+          <a:p>
+            <a:r>
+              <a:rPr lang="en-US" dirty="0" smtClean="0"/>
+              <a:t>More accurate </a:t>
+            </a:r>
+            <a:r>
+              <a:rPr lang="en-US" smtClean="0"/>
+              <a:t>data interpretation</a:t>
+            </a:r>
+          </a:p>
+          <a:p>
+            <a:endParaRPr lang="en-US" dirty="0" smtClean="0"/>
+          </a:p>
+          <a:p>
+            <a:r>
+              <a:rPr lang="en-US" smtClean="0"/>
+              <a:t>Less confusion</a:t>
+            </a:r>
+          </a:p>
+          <a:p>
+            <a:endParaRPr lang="en-US" dirty="0" smtClean="0"/>
+          </a:p>
+          <a:p>
+            <a:r>
+              <a:rPr lang="en-US" dirty="0" smtClean="0"/>
+              <a:t>Possible incorporation into computer </a:t>
+            </a:r>
+            <a:r>
+              <a:rPr lang="en-US" smtClean="0"/>
+              <a:t>graphics systems</a:t>
+            </a:r>
+          </a:p>
+          <a:p>
+            <a:endParaRPr lang="en-US"/>
+          </a:p>
+        </p:txBody>
+      </p:sp>
+    </p:spTree>
+    <p:extLst>
+      <p:ext uri="{BB962C8B-B14F-4D97-AF65-F5344CB8AC3E}">
+        <p14:creationId xmlns:p14="http://schemas.microsoft.com/office/powerpoint/2010/main" val="2855504310"/>
       </p:ext>
     </p:extLst>
   </p:cSld>
@@ -7534,11 +8442,7 @@
           <a:p>
             <a:r>
               <a:rPr lang="en-US" dirty="0" smtClean="0"/>
-              <a:t>Computer-Aided </a:t>
-            </a:r>
-            <a:r>
-              <a:rPr lang="en-US" dirty="0" smtClean="0"/>
-              <a:t>Design (CAD)</a:t>
+              <a:t>Computer-Aided Design (CAD)</a:t>
             </a:r>
             <a:endParaRPr lang="en-US" dirty="0"/>
           </a:p>
@@ -7914,35 +8818,22 @@
             <p:ph type="title"/>
           </p:nvPr>
         </p:nvSpPr>
-        <p:spPr/>
-        <p:txBody>
-          <a:bodyPr/>
-          <a:lstStyle/>
-          <a:p>
-            <a:r>
-              <a:rPr lang="en-US" dirty="0" smtClean="0"/>
-              <a:t>How this was accomplished</a:t>
-            </a:r>
-            <a:endParaRPr lang="en-US" dirty="0"/>
-          </a:p>
-        </p:txBody>
-      </p:sp>
-      <p:sp>
-        <p:nvSpPr>
-          <p:cNvPr id="3" name="Content Placeholder 2"/>
-          <p:cNvSpPr>
-            <a:spLocks noGrp="1"/>
-          </p:cNvSpPr>
-          <p:nvPr>
-            <p:ph idx="1"/>
-          </p:nvPr>
-        </p:nvSpPr>
-        <p:spPr/>
-        <p:txBody>
-          <a:bodyPr/>
-          <a:lstStyle/>
-          <a:p>
-            <a:endParaRPr lang="en-US"/>
+        <p:spPr>
+          <a:xfrm>
+            <a:off x="1089621" y="3041173"/>
+            <a:ext cx="7055380" cy="1400530"/>
+          </a:xfrm>
+        </p:spPr>
+        <p:txBody>
+          <a:bodyPr/>
+          <a:lstStyle/>
+          <a:p>
+            <a:pPr algn="ctr"/>
+            <a:r>
+              <a:rPr lang="en-US" sz="7200" dirty="0" smtClean="0"/>
+              <a:t>Methodology</a:t>
+            </a:r>
+            <a:endParaRPr lang="en-US" sz="7200" dirty="0"/>
           </a:p>
         </p:txBody>
       </p:sp>

</xml_diff>

<commit_message>
grammer and add notes to slides
</commit_message>
<xml_diff>
--- a/MSIM741_slides_BARBACHEM_COOGAN.pptx
+++ b/MSIM741_slides_BARBACHEM_COOGAN.pptx
@@ -542,12 +542,38 @@
           <a:lstStyle/>
           <a:p>
             <a:r>
+              <a:rPr lang="en-US" sz="1200" i="1" kern="1200" dirty="0" smtClean="0">
+                <a:solidFill>
+                  <a:schemeClr val="tx1"/>
+                </a:solidFill>
+                <a:effectLst/>
+                <a:latin typeface="+mn-lt"/>
+                <a:ea typeface="+mn-ea"/>
+                <a:cs typeface="+mn-cs"/>
+              </a:rPr>
+              <a:t>Guideline 4.14 – To create a set of symbol colors that can be distinguished by the most colorblind individuals, ensure variation in the yellow-blue direction (Ware, 2013).</a:t>
+            </a:r>
+            <a:r>
+              <a:rPr lang="en-US" dirty="0" smtClean="0">
+                <a:effectLst/>
+              </a:rPr>
+              <a:t> </a:t>
+            </a:r>
+          </a:p>
+          <a:p>
+            <a:r>
               <a:rPr lang="en-US" dirty="0" smtClean="0"/>
-              <a:t>The colorblind individuals will be most effected because it will level the field of data</a:t>
+              <a:t>5-8%</a:t>
             </a:r>
             <a:r>
               <a:rPr lang="en-US" baseline="0" dirty="0" smtClean="0"/>
-              <a:t> interpretation if all users see the same information. All users will be effected by the ability to dynamically change the colors, because it will provide the option of finding new colors if the current color pattern is not what they want to see.</a:t>
+              <a:t> men colorblind</a:t>
+            </a:r>
+          </a:p>
+          <a:p>
+            <a:r>
+              <a:rPr lang="en-US" baseline="0" dirty="0" smtClean="0"/>
+              <a:t>0.5-1% women colorblind</a:t>
             </a:r>
             <a:endParaRPr lang="en-US" dirty="0"/>
           </a:p>
@@ -570,7 +596,7 @@
           <a:p>
             <a:fld id="{040382CF-E665-4BCB-92D9-2442325D20B9}" type="slidenum">
               <a:rPr lang="en-US" smtClean="0"/>
-              <a:t>7</a:t>
+              <a:t>2</a:t>
             </a:fld>
             <a:endParaRPr lang="en-US"/>
           </a:p>
@@ -579,7 +605,7 @@
     </p:spTree>
     <p:extLst>
       <p:ext uri="{BB962C8B-B14F-4D97-AF65-F5344CB8AC3E}">
-        <p14:creationId xmlns:p14="http://schemas.microsoft.com/office/powerpoint/2010/main" val="550728007"/>
+        <p14:creationId xmlns:p14="http://schemas.microsoft.com/office/powerpoint/2010/main" val="547049323"/>
       </p:ext>
     </p:extLst>
   </p:cSld>
@@ -633,6 +659,14 @@
           <a:bodyPr/>
           <a:lstStyle/>
           <a:p>
+            <a:r>
+              <a:rPr lang="en-US" dirty="0" smtClean="0"/>
+              <a:t>The colorblind individuals will be most effected because it will level the field of data</a:t>
+            </a:r>
+            <a:r>
+              <a:rPr lang="en-US" baseline="0" dirty="0" smtClean="0"/>
+              <a:t> interpretation if all users see the same information. All users will be effected by the ability to dynamically change the colors, because it will provide the option of finding new colors if the current color pattern is not what they want to see.</a:t>
+            </a:r>
             <a:endParaRPr lang="en-US" dirty="0"/>
           </a:p>
         </p:txBody>
@@ -654,7 +688,7 @@
           <a:p>
             <a:fld id="{040382CF-E665-4BCB-92D9-2442325D20B9}" type="slidenum">
               <a:rPr lang="en-US" smtClean="0"/>
-              <a:t>10</a:t>
+              <a:t>7</a:t>
             </a:fld>
             <a:endParaRPr lang="en-US"/>
           </a:p>
@@ -663,7 +697,7 @@
     </p:spTree>
     <p:extLst>
       <p:ext uri="{BB962C8B-B14F-4D97-AF65-F5344CB8AC3E}">
-        <p14:creationId xmlns:p14="http://schemas.microsoft.com/office/powerpoint/2010/main" val="2303561233"/>
+        <p14:creationId xmlns:p14="http://schemas.microsoft.com/office/powerpoint/2010/main" val="550728007"/>
       </p:ext>
     </p:extLst>
   </p:cSld>
@@ -738,6 +772,90 @@
           <a:p>
             <a:fld id="{040382CF-E665-4BCB-92D9-2442325D20B9}" type="slidenum">
               <a:rPr lang="en-US" smtClean="0"/>
+              <a:t>10</a:t>
+            </a:fld>
+            <a:endParaRPr lang="en-US"/>
+          </a:p>
+        </p:txBody>
+      </p:sp>
+    </p:spTree>
+    <p:extLst>
+      <p:ext uri="{BB962C8B-B14F-4D97-AF65-F5344CB8AC3E}">
+        <p14:creationId xmlns:p14="http://schemas.microsoft.com/office/powerpoint/2010/main" val="2303561233"/>
+      </p:ext>
+    </p:extLst>
+  </p:cSld>
+  <p:clrMapOvr>
+    <a:masterClrMapping/>
+  </p:clrMapOvr>
+</p:notes>
+</file>
+
+<file path=ppt/notesSlides/notesSlide4.xml><?xml version="1.0" encoding="utf-8"?>
+<p:notes xmlns:a="http://schemas.openxmlformats.org/drawingml/2006/main" xmlns:r="http://schemas.openxmlformats.org/officeDocument/2006/relationships" xmlns:p="http://schemas.openxmlformats.org/presentationml/2006/main">
+  <p:cSld>
+    <p:spTree>
+      <p:nvGrpSpPr>
+        <p:cNvPr id="1" name=""/>
+        <p:cNvGrpSpPr/>
+        <p:nvPr/>
+      </p:nvGrpSpPr>
+      <p:grpSpPr>
+        <a:xfrm>
+          <a:off x="0" y="0"/>
+          <a:ext cx="0" cy="0"/>
+          <a:chOff x="0" y="0"/>
+          <a:chExt cx="0" cy="0"/>
+        </a:xfrm>
+      </p:grpSpPr>
+      <p:sp>
+        <p:nvSpPr>
+          <p:cNvPr id="2" name="Slide Image Placeholder 1"/>
+          <p:cNvSpPr>
+            <a:spLocks noGrp="1" noRot="1" noChangeAspect="1"/>
+          </p:cNvSpPr>
+          <p:nvPr>
+            <p:ph type="sldImg"/>
+          </p:nvPr>
+        </p:nvSpPr>
+        <p:spPr/>
+      </p:sp>
+      <p:sp>
+        <p:nvSpPr>
+          <p:cNvPr id="3" name="Notes Placeholder 2"/>
+          <p:cNvSpPr>
+            <a:spLocks noGrp="1"/>
+          </p:cNvSpPr>
+          <p:nvPr>
+            <p:ph type="body" idx="1"/>
+          </p:nvPr>
+        </p:nvSpPr>
+        <p:spPr/>
+        <p:txBody>
+          <a:bodyPr/>
+          <a:lstStyle/>
+          <a:p>
+            <a:endParaRPr lang="en-US" dirty="0"/>
+          </a:p>
+        </p:txBody>
+      </p:sp>
+      <p:sp>
+        <p:nvSpPr>
+          <p:cNvPr id="4" name="Slide Number Placeholder 3"/>
+          <p:cNvSpPr>
+            <a:spLocks noGrp="1"/>
+          </p:cNvSpPr>
+          <p:nvPr>
+            <p:ph type="sldNum" sz="quarter" idx="10"/>
+          </p:nvPr>
+        </p:nvSpPr>
+        <p:spPr/>
+        <p:txBody>
+          <a:bodyPr/>
+          <a:lstStyle/>
+          <a:p>
+            <a:fld id="{040382CF-E665-4BCB-92D9-2442325D20B9}" type="slidenum">
+              <a:rPr lang="en-US" smtClean="0"/>
               <a:t>15</a:t>
             </a:fld>
             <a:endParaRPr lang="en-US"/>
@@ -748,6 +866,853 @@
     <p:extLst>
       <p:ext uri="{BB962C8B-B14F-4D97-AF65-F5344CB8AC3E}">
         <p14:creationId xmlns:p14="http://schemas.microsoft.com/office/powerpoint/2010/main" val="49714348"/>
+      </p:ext>
+    </p:extLst>
+  </p:cSld>
+  <p:clrMapOvr>
+    <a:masterClrMapping/>
+  </p:clrMapOvr>
+</p:notes>
+</file>
+
+<file path=ppt/notesSlides/notesSlide5.xml><?xml version="1.0" encoding="utf-8"?>
+<p:notes xmlns:a="http://schemas.openxmlformats.org/drawingml/2006/main" xmlns:r="http://schemas.openxmlformats.org/officeDocument/2006/relationships" xmlns:p="http://schemas.openxmlformats.org/presentationml/2006/main">
+  <p:cSld>
+    <p:spTree>
+      <p:nvGrpSpPr>
+        <p:cNvPr id="1" name=""/>
+        <p:cNvGrpSpPr/>
+        <p:nvPr/>
+      </p:nvGrpSpPr>
+      <p:grpSpPr>
+        <a:xfrm>
+          <a:off x="0" y="0"/>
+          <a:ext cx="0" cy="0"/>
+          <a:chOff x="0" y="0"/>
+          <a:chExt cx="0" cy="0"/>
+        </a:xfrm>
+      </p:grpSpPr>
+      <p:sp>
+        <p:nvSpPr>
+          <p:cNvPr id="2" name="Slide Image Placeholder 1"/>
+          <p:cNvSpPr>
+            <a:spLocks noGrp="1" noRot="1" noChangeAspect="1"/>
+          </p:cNvSpPr>
+          <p:nvPr>
+            <p:ph type="sldImg"/>
+          </p:nvPr>
+        </p:nvSpPr>
+        <p:spPr/>
+      </p:sp>
+      <p:sp>
+        <p:nvSpPr>
+          <p:cNvPr id="3" name="Notes Placeholder 2"/>
+          <p:cNvSpPr>
+            <a:spLocks noGrp="1"/>
+          </p:cNvSpPr>
+          <p:nvPr>
+            <p:ph type="body" idx="1"/>
+          </p:nvPr>
+        </p:nvSpPr>
+        <p:spPr/>
+        <p:txBody>
+          <a:bodyPr/>
+          <a:lstStyle/>
+          <a:p>
+            <a:r>
+              <a:rPr lang="en-US" dirty="0" smtClean="0"/>
+              <a:t>No limitations on color scale </a:t>
+            </a:r>
+            <a:endParaRPr lang="en-US" dirty="0"/>
+          </a:p>
+        </p:txBody>
+      </p:sp>
+      <p:sp>
+        <p:nvSpPr>
+          <p:cNvPr id="4" name="Slide Number Placeholder 3"/>
+          <p:cNvSpPr>
+            <a:spLocks noGrp="1"/>
+          </p:cNvSpPr>
+          <p:nvPr>
+            <p:ph type="sldNum" sz="quarter" idx="10"/>
+          </p:nvPr>
+        </p:nvSpPr>
+        <p:spPr/>
+        <p:txBody>
+          <a:bodyPr/>
+          <a:lstStyle/>
+          <a:p>
+            <a:fld id="{040382CF-E665-4BCB-92D9-2442325D20B9}" type="slidenum">
+              <a:rPr lang="en-US" smtClean="0"/>
+              <a:t>16</a:t>
+            </a:fld>
+            <a:endParaRPr lang="en-US"/>
+          </a:p>
+        </p:txBody>
+      </p:sp>
+    </p:spTree>
+    <p:extLst>
+      <p:ext uri="{BB962C8B-B14F-4D97-AF65-F5344CB8AC3E}">
+        <p14:creationId xmlns:p14="http://schemas.microsoft.com/office/powerpoint/2010/main" val="1602478805"/>
+      </p:ext>
+    </p:extLst>
+  </p:cSld>
+  <p:clrMapOvr>
+    <a:masterClrMapping/>
+  </p:clrMapOvr>
+</p:notes>
+</file>
+
+<file path=ppt/notesSlides/notesSlide6.xml><?xml version="1.0" encoding="utf-8"?>
+<p:notes xmlns:a="http://schemas.openxmlformats.org/drawingml/2006/main" xmlns:r="http://schemas.openxmlformats.org/officeDocument/2006/relationships" xmlns:p="http://schemas.openxmlformats.org/presentationml/2006/main">
+  <p:cSld>
+    <p:spTree>
+      <p:nvGrpSpPr>
+        <p:cNvPr id="1" name=""/>
+        <p:cNvGrpSpPr/>
+        <p:nvPr/>
+      </p:nvGrpSpPr>
+      <p:grpSpPr>
+        <a:xfrm>
+          <a:off x="0" y="0"/>
+          <a:ext cx="0" cy="0"/>
+          <a:chOff x="0" y="0"/>
+          <a:chExt cx="0" cy="0"/>
+        </a:xfrm>
+      </p:grpSpPr>
+      <p:sp>
+        <p:nvSpPr>
+          <p:cNvPr id="2" name="Slide Image Placeholder 1"/>
+          <p:cNvSpPr>
+            <a:spLocks noGrp="1" noRot="1" noChangeAspect="1"/>
+          </p:cNvSpPr>
+          <p:nvPr>
+            <p:ph type="sldImg"/>
+          </p:nvPr>
+        </p:nvSpPr>
+        <p:spPr/>
+      </p:sp>
+      <p:sp>
+        <p:nvSpPr>
+          <p:cNvPr id="3" name="Notes Placeholder 2"/>
+          <p:cNvSpPr>
+            <a:spLocks noGrp="1"/>
+          </p:cNvSpPr>
+          <p:nvPr>
+            <p:ph type="body" idx="1"/>
+          </p:nvPr>
+        </p:nvSpPr>
+        <p:spPr/>
+        <p:txBody>
+          <a:bodyPr/>
+          <a:lstStyle/>
+          <a:p>
+            <a:r>
+              <a:rPr lang="en-US" dirty="0" smtClean="0"/>
+              <a:t>No blue or yellow</a:t>
+            </a:r>
+          </a:p>
+          <a:p>
+            <a:r>
+              <a:rPr lang="en-US" sz="1200" kern="1200" dirty="0" err="1" smtClean="0">
+                <a:solidFill>
+                  <a:schemeClr val="tx1"/>
+                </a:solidFill>
+                <a:effectLst/>
+                <a:latin typeface="+mn-lt"/>
+                <a:ea typeface="+mn-ea"/>
+                <a:cs typeface="+mn-cs"/>
+              </a:rPr>
+              <a:t>Tritanopia</a:t>
+            </a:r>
+            <a:r>
+              <a:rPr lang="en-US" sz="1200" kern="1200" dirty="0" smtClean="0">
+                <a:solidFill>
+                  <a:schemeClr val="tx1"/>
+                </a:solidFill>
+                <a:effectLst/>
+                <a:latin typeface="+mn-lt"/>
+                <a:ea typeface="+mn-ea"/>
+                <a:cs typeface="+mn-cs"/>
+              </a:rPr>
+              <a:t> is defined as the inability to differentiate between </a:t>
+            </a:r>
+            <a:r>
+              <a:rPr lang="en-US" sz="1200" b="1" kern="1200" dirty="0" smtClean="0">
+                <a:solidFill>
+                  <a:schemeClr val="tx1"/>
+                </a:solidFill>
+                <a:effectLst/>
+                <a:latin typeface="+mn-lt"/>
+                <a:ea typeface="+mn-ea"/>
+                <a:cs typeface="+mn-cs"/>
+              </a:rPr>
+              <a:t>blue</a:t>
+            </a:r>
+            <a:r>
+              <a:rPr lang="en-US" sz="1200" kern="1200" dirty="0" smtClean="0">
+                <a:solidFill>
+                  <a:schemeClr val="tx1"/>
+                </a:solidFill>
+                <a:effectLst/>
+                <a:latin typeface="+mn-lt"/>
+                <a:ea typeface="+mn-ea"/>
+                <a:cs typeface="+mn-cs"/>
+              </a:rPr>
+              <a:t> and </a:t>
+            </a:r>
+            <a:r>
+              <a:rPr lang="en-US" sz="1200" b="1" kern="1200" dirty="0" smtClean="0">
+                <a:solidFill>
+                  <a:schemeClr val="tx1"/>
+                </a:solidFill>
+                <a:effectLst/>
+                <a:latin typeface="+mn-lt"/>
+                <a:ea typeface="+mn-ea"/>
+                <a:cs typeface="+mn-cs"/>
+              </a:rPr>
+              <a:t>yellow</a:t>
+            </a:r>
+            <a:r>
+              <a:rPr lang="en-US" sz="1200" kern="1200" dirty="0" smtClean="0">
+                <a:solidFill>
+                  <a:schemeClr val="tx1"/>
+                </a:solidFill>
+                <a:effectLst/>
+                <a:latin typeface="+mn-lt"/>
+                <a:ea typeface="+mn-ea"/>
+                <a:cs typeface="+mn-cs"/>
+              </a:rPr>
+              <a:t> colors</a:t>
+            </a:r>
+            <a:endParaRPr lang="en-US" dirty="0"/>
+          </a:p>
+        </p:txBody>
+      </p:sp>
+      <p:sp>
+        <p:nvSpPr>
+          <p:cNvPr id="4" name="Slide Number Placeholder 3"/>
+          <p:cNvSpPr>
+            <a:spLocks noGrp="1"/>
+          </p:cNvSpPr>
+          <p:nvPr>
+            <p:ph type="sldNum" sz="quarter" idx="10"/>
+          </p:nvPr>
+        </p:nvSpPr>
+        <p:spPr/>
+        <p:txBody>
+          <a:bodyPr/>
+          <a:lstStyle/>
+          <a:p>
+            <a:fld id="{040382CF-E665-4BCB-92D9-2442325D20B9}" type="slidenum">
+              <a:rPr lang="en-US" smtClean="0"/>
+              <a:t>17</a:t>
+            </a:fld>
+            <a:endParaRPr lang="en-US"/>
+          </a:p>
+        </p:txBody>
+      </p:sp>
+    </p:spTree>
+    <p:extLst>
+      <p:ext uri="{BB962C8B-B14F-4D97-AF65-F5344CB8AC3E}">
+        <p14:creationId xmlns:p14="http://schemas.microsoft.com/office/powerpoint/2010/main" val="3926743106"/>
+      </p:ext>
+    </p:extLst>
+  </p:cSld>
+  <p:clrMapOvr>
+    <a:masterClrMapping/>
+  </p:clrMapOvr>
+</p:notes>
+</file>
+
+<file path=ppt/notesSlides/notesSlide7.xml><?xml version="1.0" encoding="utf-8"?>
+<p:notes xmlns:a="http://schemas.openxmlformats.org/drawingml/2006/main" xmlns:r="http://schemas.openxmlformats.org/officeDocument/2006/relationships" xmlns:p="http://schemas.openxmlformats.org/presentationml/2006/main">
+  <p:cSld>
+    <p:spTree>
+      <p:nvGrpSpPr>
+        <p:cNvPr id="1" name=""/>
+        <p:cNvGrpSpPr/>
+        <p:nvPr/>
+      </p:nvGrpSpPr>
+      <p:grpSpPr>
+        <a:xfrm>
+          <a:off x="0" y="0"/>
+          <a:ext cx="0" cy="0"/>
+          <a:chOff x="0" y="0"/>
+          <a:chExt cx="0" cy="0"/>
+        </a:xfrm>
+      </p:grpSpPr>
+      <p:sp>
+        <p:nvSpPr>
+          <p:cNvPr id="2" name="Slide Image Placeholder 1"/>
+          <p:cNvSpPr>
+            <a:spLocks noGrp="1" noRot="1" noChangeAspect="1"/>
+          </p:cNvSpPr>
+          <p:nvPr>
+            <p:ph type="sldImg"/>
+          </p:nvPr>
+        </p:nvSpPr>
+        <p:spPr/>
+      </p:sp>
+      <p:sp>
+        <p:nvSpPr>
+          <p:cNvPr id="3" name="Notes Placeholder 2"/>
+          <p:cNvSpPr>
+            <a:spLocks noGrp="1"/>
+          </p:cNvSpPr>
+          <p:nvPr>
+            <p:ph type="body" idx="1"/>
+          </p:nvPr>
+        </p:nvSpPr>
+        <p:spPr/>
+        <p:txBody>
+          <a:bodyPr/>
+          <a:lstStyle/>
+          <a:p>
+            <a:r>
+              <a:rPr lang="en-US" dirty="0" smtClean="0"/>
+              <a:t>No green </a:t>
+            </a:r>
+            <a:endParaRPr lang="en-US" dirty="0"/>
+          </a:p>
+        </p:txBody>
+      </p:sp>
+      <p:sp>
+        <p:nvSpPr>
+          <p:cNvPr id="4" name="Slide Number Placeholder 3"/>
+          <p:cNvSpPr>
+            <a:spLocks noGrp="1"/>
+          </p:cNvSpPr>
+          <p:nvPr>
+            <p:ph type="sldNum" sz="quarter" idx="10"/>
+          </p:nvPr>
+        </p:nvSpPr>
+        <p:spPr/>
+        <p:txBody>
+          <a:bodyPr/>
+          <a:lstStyle/>
+          <a:p>
+            <a:fld id="{040382CF-E665-4BCB-92D9-2442325D20B9}" type="slidenum">
+              <a:rPr lang="en-US" smtClean="0"/>
+              <a:t>18</a:t>
+            </a:fld>
+            <a:endParaRPr lang="en-US"/>
+          </a:p>
+        </p:txBody>
+      </p:sp>
+    </p:spTree>
+    <p:extLst>
+      <p:ext uri="{BB962C8B-B14F-4D97-AF65-F5344CB8AC3E}">
+        <p14:creationId xmlns:p14="http://schemas.microsoft.com/office/powerpoint/2010/main" val="139219676"/>
+      </p:ext>
+    </p:extLst>
+  </p:cSld>
+  <p:clrMapOvr>
+    <a:masterClrMapping/>
+  </p:clrMapOvr>
+</p:notes>
+</file>
+
+<file path=ppt/notesSlides/notesSlide8.xml><?xml version="1.0" encoding="utf-8"?>
+<p:notes xmlns:a="http://schemas.openxmlformats.org/drawingml/2006/main" xmlns:r="http://schemas.openxmlformats.org/officeDocument/2006/relationships" xmlns:p="http://schemas.openxmlformats.org/presentationml/2006/main">
+  <p:cSld>
+    <p:spTree>
+      <p:nvGrpSpPr>
+        <p:cNvPr id="1" name=""/>
+        <p:cNvGrpSpPr/>
+        <p:nvPr/>
+      </p:nvGrpSpPr>
+      <p:grpSpPr>
+        <a:xfrm>
+          <a:off x="0" y="0"/>
+          <a:ext cx="0" cy="0"/>
+          <a:chOff x="0" y="0"/>
+          <a:chExt cx="0" cy="0"/>
+        </a:xfrm>
+      </p:grpSpPr>
+      <p:sp>
+        <p:nvSpPr>
+          <p:cNvPr id="2" name="Slide Image Placeholder 1"/>
+          <p:cNvSpPr>
+            <a:spLocks noGrp="1" noRot="1" noChangeAspect="1"/>
+          </p:cNvSpPr>
+          <p:nvPr>
+            <p:ph type="sldImg"/>
+          </p:nvPr>
+        </p:nvSpPr>
+        <p:spPr/>
+      </p:sp>
+      <p:sp>
+        <p:nvSpPr>
+          <p:cNvPr id="3" name="Notes Placeholder 2"/>
+          <p:cNvSpPr>
+            <a:spLocks noGrp="1"/>
+          </p:cNvSpPr>
+          <p:nvPr>
+            <p:ph type="body" idx="1"/>
+          </p:nvPr>
+        </p:nvSpPr>
+        <p:spPr/>
+        <p:txBody>
+          <a:bodyPr/>
+          <a:lstStyle/>
+          <a:p>
+            <a:r>
+              <a:rPr lang="en-US" dirty="0" smtClean="0"/>
+              <a:t>No red </a:t>
+            </a:r>
+          </a:p>
+          <a:p>
+            <a:endParaRPr lang="en-US" dirty="0" smtClean="0"/>
+          </a:p>
+          <a:p>
+            <a:r>
+              <a:rPr lang="en-US" sz="1200" kern="1200" dirty="0" err="1" smtClean="0">
+                <a:solidFill>
+                  <a:schemeClr val="tx1"/>
+                </a:solidFill>
+                <a:effectLst/>
+                <a:latin typeface="+mn-lt"/>
+                <a:ea typeface="+mn-ea"/>
+                <a:cs typeface="+mn-cs"/>
+              </a:rPr>
+              <a:t>Protanopia</a:t>
+            </a:r>
+            <a:r>
+              <a:rPr lang="en-US" sz="1200" kern="1200" dirty="0" smtClean="0">
+                <a:solidFill>
+                  <a:schemeClr val="tx1"/>
+                </a:solidFill>
+                <a:effectLst/>
+                <a:latin typeface="+mn-lt"/>
+                <a:ea typeface="+mn-ea"/>
+                <a:cs typeface="+mn-cs"/>
+              </a:rPr>
+              <a:t> and </a:t>
+            </a:r>
+            <a:r>
+              <a:rPr lang="en-US" sz="1200" kern="1200" dirty="0" err="1" smtClean="0">
+                <a:solidFill>
+                  <a:schemeClr val="tx1"/>
+                </a:solidFill>
+                <a:effectLst/>
+                <a:latin typeface="+mn-lt"/>
+                <a:ea typeface="+mn-ea"/>
+                <a:cs typeface="+mn-cs"/>
+              </a:rPr>
+              <a:t>Deuteranopia</a:t>
+            </a:r>
+            <a:r>
+              <a:rPr lang="en-US" sz="1200" kern="1200" dirty="0" smtClean="0">
+                <a:solidFill>
+                  <a:schemeClr val="tx1"/>
+                </a:solidFill>
+                <a:effectLst/>
+                <a:latin typeface="+mn-lt"/>
+                <a:ea typeface="+mn-ea"/>
+                <a:cs typeface="+mn-cs"/>
+              </a:rPr>
+              <a:t>  characterized by the inability to differentiate </a:t>
+            </a:r>
+            <a:r>
+              <a:rPr lang="en-US" sz="1200" b="1" kern="1200" dirty="0" smtClean="0">
+                <a:solidFill>
+                  <a:schemeClr val="tx1"/>
+                </a:solidFill>
+                <a:effectLst/>
+                <a:latin typeface="+mn-lt"/>
+                <a:ea typeface="+mn-ea"/>
+                <a:cs typeface="+mn-cs"/>
+              </a:rPr>
+              <a:t>red</a:t>
+            </a:r>
+            <a:r>
+              <a:rPr lang="en-US" sz="1200" kern="1200" dirty="0" smtClean="0">
+                <a:solidFill>
+                  <a:schemeClr val="tx1"/>
+                </a:solidFill>
+                <a:effectLst/>
+                <a:latin typeface="+mn-lt"/>
+                <a:ea typeface="+mn-ea"/>
+                <a:cs typeface="+mn-cs"/>
+              </a:rPr>
+              <a:t> and </a:t>
+            </a:r>
+            <a:r>
+              <a:rPr lang="en-US" sz="1200" b="1" kern="1200" dirty="0" smtClean="0">
+                <a:solidFill>
+                  <a:schemeClr val="tx1"/>
+                </a:solidFill>
+                <a:effectLst/>
+                <a:latin typeface="+mn-lt"/>
+                <a:ea typeface="+mn-ea"/>
+                <a:cs typeface="+mn-cs"/>
+              </a:rPr>
+              <a:t>green</a:t>
+            </a:r>
+            <a:r>
+              <a:rPr lang="en-US" sz="1200" kern="1200" dirty="0" smtClean="0">
+                <a:solidFill>
+                  <a:schemeClr val="tx1"/>
+                </a:solidFill>
+                <a:effectLst/>
+                <a:latin typeface="+mn-lt"/>
+                <a:ea typeface="+mn-ea"/>
+                <a:cs typeface="+mn-cs"/>
+              </a:rPr>
+              <a:t> shades</a:t>
+            </a:r>
+            <a:r>
+              <a:rPr lang="en-US" dirty="0" smtClean="0">
+                <a:effectLst/>
+              </a:rPr>
+              <a:t> </a:t>
+            </a:r>
+            <a:endParaRPr lang="en-US" dirty="0" smtClean="0"/>
+          </a:p>
+          <a:p>
+            <a:pPr marL="0" marR="0" indent="0" algn="l" defTabSz="914400" rtl="0" eaLnBrk="1" fontAlgn="auto" latinLnBrk="0" hangingPunct="1">
+              <a:lnSpc>
+                <a:spcPct val="100000"/>
+              </a:lnSpc>
+              <a:spcBef>
+                <a:spcPts val="0"/>
+              </a:spcBef>
+              <a:spcAft>
+                <a:spcPts val="0"/>
+              </a:spcAft>
+              <a:buClrTx/>
+              <a:buSzTx/>
+              <a:buFontTx/>
+              <a:buNone/>
+              <a:tabLst/>
+              <a:defRPr/>
+            </a:pPr>
+            <a:r>
+              <a:rPr lang="en-US" sz="1200" kern="1200" dirty="0" smtClean="0">
+                <a:solidFill>
+                  <a:schemeClr val="tx1"/>
+                </a:solidFill>
+                <a:effectLst/>
+                <a:latin typeface="+mn-lt"/>
+                <a:ea typeface="+mn-ea"/>
+                <a:cs typeface="+mn-cs"/>
+              </a:rPr>
+              <a:t>In order to display a visual difference between </a:t>
+            </a:r>
+            <a:r>
+              <a:rPr lang="en-US" sz="1200" kern="1200" dirty="0" err="1" smtClean="0">
+                <a:solidFill>
+                  <a:schemeClr val="tx1"/>
+                </a:solidFill>
+                <a:effectLst/>
+                <a:latin typeface="+mn-lt"/>
+                <a:ea typeface="+mn-ea"/>
+                <a:cs typeface="+mn-cs"/>
+              </a:rPr>
+              <a:t>Protanopia</a:t>
+            </a:r>
+            <a:r>
+              <a:rPr lang="en-US" sz="1200" kern="1200" dirty="0" smtClean="0">
+                <a:solidFill>
+                  <a:schemeClr val="tx1"/>
+                </a:solidFill>
+                <a:effectLst/>
+                <a:latin typeface="+mn-lt"/>
+                <a:ea typeface="+mn-ea"/>
+                <a:cs typeface="+mn-cs"/>
+              </a:rPr>
+              <a:t> and </a:t>
+            </a:r>
+            <a:r>
+              <a:rPr lang="en-US" sz="1200" kern="1200" dirty="0" err="1" smtClean="0">
+                <a:solidFill>
+                  <a:schemeClr val="tx1"/>
+                </a:solidFill>
+                <a:effectLst/>
+                <a:latin typeface="+mn-lt"/>
+                <a:ea typeface="+mn-ea"/>
+                <a:cs typeface="+mn-cs"/>
+              </a:rPr>
+              <a:t>Deuteranopia</a:t>
+            </a:r>
+            <a:r>
+              <a:rPr lang="en-US" sz="1200" kern="1200" dirty="0" smtClean="0">
+                <a:solidFill>
+                  <a:schemeClr val="tx1"/>
+                </a:solidFill>
+                <a:effectLst/>
+                <a:latin typeface="+mn-lt"/>
+                <a:ea typeface="+mn-ea"/>
+                <a:cs typeface="+mn-cs"/>
+              </a:rPr>
+              <a:t>  options</a:t>
+            </a:r>
+          </a:p>
+          <a:p>
+            <a:pPr marL="0" marR="0" indent="0" algn="l" defTabSz="914400" rtl="0" eaLnBrk="1" fontAlgn="auto" latinLnBrk="0" hangingPunct="1">
+              <a:lnSpc>
+                <a:spcPct val="100000"/>
+              </a:lnSpc>
+              <a:spcBef>
+                <a:spcPts val="0"/>
+              </a:spcBef>
+              <a:spcAft>
+                <a:spcPts val="0"/>
+              </a:spcAft>
+              <a:buClrTx/>
+              <a:buSzTx/>
+              <a:buFontTx/>
+              <a:buNone/>
+              <a:tabLst/>
+              <a:defRPr/>
+            </a:pPr>
+            <a:r>
+              <a:rPr lang="en-US" sz="1200" kern="1200" dirty="0" smtClean="0">
+                <a:solidFill>
+                  <a:schemeClr val="tx1"/>
+                </a:solidFill>
+                <a:effectLst/>
+                <a:latin typeface="+mn-lt"/>
+                <a:ea typeface="+mn-ea"/>
+                <a:cs typeface="+mn-cs"/>
+              </a:rPr>
+              <a:t>eliminate the </a:t>
+            </a:r>
+            <a:r>
+              <a:rPr lang="en-US" sz="1200" b="1" kern="1200" dirty="0" smtClean="0">
+                <a:solidFill>
+                  <a:schemeClr val="tx1"/>
+                </a:solidFill>
+                <a:effectLst/>
+                <a:latin typeface="+mn-lt"/>
+                <a:ea typeface="+mn-ea"/>
+                <a:cs typeface="+mn-cs"/>
+              </a:rPr>
+              <a:t>red</a:t>
+            </a:r>
+            <a:r>
+              <a:rPr lang="en-US" sz="1200" kern="1200" dirty="0" smtClean="0">
+                <a:solidFill>
+                  <a:schemeClr val="tx1"/>
+                </a:solidFill>
+                <a:effectLst/>
+                <a:latin typeface="+mn-lt"/>
+                <a:ea typeface="+mn-ea"/>
+                <a:cs typeface="+mn-cs"/>
+              </a:rPr>
+              <a:t> colors when the user selects </a:t>
+            </a:r>
+            <a:r>
+              <a:rPr lang="en-US" sz="1200" kern="1200" dirty="0" err="1" smtClean="0">
+                <a:solidFill>
+                  <a:schemeClr val="tx1"/>
+                </a:solidFill>
+                <a:effectLst/>
+                <a:latin typeface="+mn-lt"/>
+                <a:ea typeface="+mn-ea"/>
+                <a:cs typeface="+mn-cs"/>
+              </a:rPr>
+              <a:t>Protanopia</a:t>
+            </a:r>
+            <a:r>
+              <a:rPr lang="en-US" sz="1200" kern="1200" dirty="0" smtClean="0">
+                <a:solidFill>
+                  <a:schemeClr val="tx1"/>
+                </a:solidFill>
+                <a:effectLst/>
+                <a:latin typeface="+mn-lt"/>
+                <a:ea typeface="+mn-ea"/>
+                <a:cs typeface="+mn-cs"/>
+              </a:rPr>
+              <a:t>, </a:t>
+            </a:r>
+          </a:p>
+          <a:p>
+            <a:pPr marL="0" marR="0" indent="0" algn="l" defTabSz="914400" rtl="0" eaLnBrk="1" fontAlgn="auto" latinLnBrk="0" hangingPunct="1">
+              <a:lnSpc>
+                <a:spcPct val="100000"/>
+              </a:lnSpc>
+              <a:spcBef>
+                <a:spcPts val="0"/>
+              </a:spcBef>
+              <a:spcAft>
+                <a:spcPts val="0"/>
+              </a:spcAft>
+              <a:buClrTx/>
+              <a:buSzTx/>
+              <a:buFontTx/>
+              <a:buNone/>
+              <a:tabLst/>
+              <a:defRPr/>
+            </a:pPr>
+            <a:r>
+              <a:rPr lang="en-US" sz="1200" kern="1200" dirty="0" smtClean="0">
+                <a:solidFill>
+                  <a:schemeClr val="tx1"/>
+                </a:solidFill>
+                <a:effectLst/>
+                <a:latin typeface="+mn-lt"/>
+                <a:ea typeface="+mn-ea"/>
+                <a:cs typeface="+mn-cs"/>
+              </a:rPr>
+              <a:t>eliminate the </a:t>
+            </a:r>
+            <a:r>
+              <a:rPr lang="en-US" sz="1200" b="1" kern="1200" dirty="0" smtClean="0">
+                <a:solidFill>
+                  <a:schemeClr val="tx1"/>
+                </a:solidFill>
+                <a:effectLst/>
+                <a:latin typeface="+mn-lt"/>
+                <a:ea typeface="+mn-ea"/>
+                <a:cs typeface="+mn-cs"/>
+              </a:rPr>
+              <a:t>green</a:t>
+            </a:r>
+            <a:r>
+              <a:rPr lang="en-US" sz="1200" kern="1200" dirty="0" smtClean="0">
+                <a:solidFill>
+                  <a:schemeClr val="tx1"/>
+                </a:solidFill>
+                <a:effectLst/>
+                <a:latin typeface="+mn-lt"/>
+                <a:ea typeface="+mn-ea"/>
+                <a:cs typeface="+mn-cs"/>
+              </a:rPr>
+              <a:t> colors when the user selects </a:t>
+            </a:r>
+            <a:r>
+              <a:rPr lang="en-US" sz="1200" kern="1200" smtClean="0">
+                <a:solidFill>
+                  <a:schemeClr val="tx1"/>
+                </a:solidFill>
+                <a:effectLst/>
+                <a:latin typeface="+mn-lt"/>
+                <a:ea typeface="+mn-ea"/>
+                <a:cs typeface="+mn-cs"/>
+              </a:rPr>
+              <a:t>Deuteranopia</a:t>
+            </a:r>
+            <a:endParaRPr lang="en-US" dirty="0"/>
+          </a:p>
+        </p:txBody>
+      </p:sp>
+      <p:sp>
+        <p:nvSpPr>
+          <p:cNvPr id="4" name="Slide Number Placeholder 3"/>
+          <p:cNvSpPr>
+            <a:spLocks noGrp="1"/>
+          </p:cNvSpPr>
+          <p:nvPr>
+            <p:ph type="sldNum" sz="quarter" idx="10"/>
+          </p:nvPr>
+        </p:nvSpPr>
+        <p:spPr/>
+        <p:txBody>
+          <a:bodyPr/>
+          <a:lstStyle/>
+          <a:p>
+            <a:fld id="{040382CF-E665-4BCB-92D9-2442325D20B9}" type="slidenum">
+              <a:rPr lang="en-US" smtClean="0"/>
+              <a:t>19</a:t>
+            </a:fld>
+            <a:endParaRPr lang="en-US"/>
+          </a:p>
+        </p:txBody>
+      </p:sp>
+    </p:spTree>
+    <p:extLst>
+      <p:ext uri="{BB962C8B-B14F-4D97-AF65-F5344CB8AC3E}">
+        <p14:creationId xmlns:p14="http://schemas.microsoft.com/office/powerpoint/2010/main" val="2478180565"/>
+      </p:ext>
+    </p:extLst>
+  </p:cSld>
+  <p:clrMapOvr>
+    <a:masterClrMapping/>
+  </p:clrMapOvr>
+</p:notes>
+</file>
+
+<file path=ppt/notesSlides/notesSlide9.xml><?xml version="1.0" encoding="utf-8"?>
+<p:notes xmlns:a="http://schemas.openxmlformats.org/drawingml/2006/main" xmlns:r="http://schemas.openxmlformats.org/officeDocument/2006/relationships" xmlns:p="http://schemas.openxmlformats.org/presentationml/2006/main">
+  <p:cSld>
+    <p:spTree>
+      <p:nvGrpSpPr>
+        <p:cNvPr id="1" name=""/>
+        <p:cNvGrpSpPr/>
+        <p:nvPr/>
+      </p:nvGrpSpPr>
+      <p:grpSpPr>
+        <a:xfrm>
+          <a:off x="0" y="0"/>
+          <a:ext cx="0" cy="0"/>
+          <a:chOff x="0" y="0"/>
+          <a:chExt cx="0" cy="0"/>
+        </a:xfrm>
+      </p:grpSpPr>
+      <p:sp>
+        <p:nvSpPr>
+          <p:cNvPr id="2" name="Slide Image Placeholder 1"/>
+          <p:cNvSpPr>
+            <a:spLocks noGrp="1" noRot="1" noChangeAspect="1"/>
+          </p:cNvSpPr>
+          <p:nvPr>
+            <p:ph type="sldImg"/>
+          </p:nvPr>
+        </p:nvSpPr>
+        <p:spPr/>
+      </p:sp>
+      <p:sp>
+        <p:nvSpPr>
+          <p:cNvPr id="3" name="Notes Placeholder 2"/>
+          <p:cNvSpPr>
+            <a:spLocks noGrp="1"/>
+          </p:cNvSpPr>
+          <p:nvPr>
+            <p:ph type="body" idx="1"/>
+          </p:nvPr>
+        </p:nvSpPr>
+        <p:spPr/>
+        <p:txBody>
+          <a:bodyPr/>
+          <a:lstStyle/>
+          <a:p>
+            <a:r>
+              <a:rPr lang="en-US" dirty="0" smtClean="0"/>
+              <a:t>Gray scale</a:t>
+            </a:r>
+            <a:endParaRPr lang="en-US" dirty="0"/>
+          </a:p>
+        </p:txBody>
+      </p:sp>
+      <p:sp>
+        <p:nvSpPr>
+          <p:cNvPr id="4" name="Slide Number Placeholder 3"/>
+          <p:cNvSpPr>
+            <a:spLocks noGrp="1"/>
+          </p:cNvSpPr>
+          <p:nvPr>
+            <p:ph type="sldNum" sz="quarter" idx="10"/>
+          </p:nvPr>
+        </p:nvSpPr>
+        <p:spPr/>
+        <p:txBody>
+          <a:bodyPr/>
+          <a:lstStyle/>
+          <a:p>
+            <a:fld id="{040382CF-E665-4BCB-92D9-2442325D20B9}" type="slidenum">
+              <a:rPr lang="en-US" smtClean="0"/>
+              <a:t>20</a:t>
+            </a:fld>
+            <a:endParaRPr lang="en-US"/>
+          </a:p>
+        </p:txBody>
+      </p:sp>
+    </p:spTree>
+    <p:extLst>
+      <p:ext uri="{BB962C8B-B14F-4D97-AF65-F5344CB8AC3E}">
+        <p14:creationId xmlns:p14="http://schemas.microsoft.com/office/powerpoint/2010/main" val="3887309954"/>
       </p:ext>
     </p:extLst>
   </p:cSld>
@@ -7435,7 +8400,7 @@
           </p:nvPr>
         </p:nvPicPr>
         <p:blipFill>
-          <a:blip r:embed="rId2">
+          <a:blip r:embed="rId3">
             <a:extLst>
               <a:ext uri="{28A0092B-C50C-407E-A947-70E740481C1C}">
                 <a14:useLocalDpi xmlns:a14="http://schemas.microsoft.com/office/drawing/2010/main" val="0"/>
@@ -7564,7 +8529,7 @@
           </p:nvPr>
         </p:nvPicPr>
         <p:blipFill>
-          <a:blip r:embed="rId2">
+          <a:blip r:embed="rId3">
             <a:extLst>
               <a:ext uri="{28A0092B-C50C-407E-A947-70E740481C1C}">
                 <a14:useLocalDpi xmlns:a14="http://schemas.microsoft.com/office/drawing/2010/main" val="0"/>
@@ -7693,7 +8658,7 @@
           </p:nvPr>
         </p:nvPicPr>
         <p:blipFill>
-          <a:blip r:embed="rId2">
+          <a:blip r:embed="rId3">
             <a:extLst>
               <a:ext uri="{28A0092B-C50C-407E-A947-70E740481C1C}">
                 <a14:useLocalDpi xmlns:a14="http://schemas.microsoft.com/office/drawing/2010/main" val="0"/>
@@ -7822,7 +8787,7 @@
           </p:nvPr>
         </p:nvPicPr>
         <p:blipFill>
-          <a:blip r:embed="rId2">
+          <a:blip r:embed="rId3">
             <a:extLst>
               <a:ext uri="{28A0092B-C50C-407E-A947-70E740481C1C}">
                 <a14:useLocalDpi xmlns:a14="http://schemas.microsoft.com/office/drawing/2010/main" val="0"/>
@@ -8040,7 +9005,7 @@
           </p:nvPr>
         </p:nvPicPr>
         <p:blipFill>
-          <a:blip r:embed="rId2">
+          <a:blip r:embed="rId3">
             <a:extLst>
               <a:ext uri="{28A0092B-C50C-407E-A947-70E740481C1C}">
                 <a14:useLocalDpi xmlns:a14="http://schemas.microsoft.com/office/drawing/2010/main" val="0"/>
@@ -8140,25 +9105,49 @@
             <p:ph type="title"/>
           </p:nvPr>
         </p:nvSpPr>
+        <p:spPr/>
+        <p:txBody>
+          <a:bodyPr/>
+          <a:lstStyle/>
+          <a:p>
+            <a:r>
+              <a:rPr lang="en-US" dirty="0" smtClean="0"/>
+              <a:t>Demonstration</a:t>
+            </a:r>
+            <a:endParaRPr lang="en-US" dirty="0"/>
+          </a:p>
+        </p:txBody>
+      </p:sp>
+      <p:pic>
+        <p:nvPicPr>
+          <p:cNvPr id="3" name="Picture 2" descr="demo.jpeg"/>
+          <p:cNvPicPr>
+            <a:picLocks noChangeAspect="1"/>
+          </p:cNvPicPr>
+          <p:nvPr/>
+        </p:nvPicPr>
+        <p:blipFill>
+          <a:blip r:embed="rId2">
+            <a:extLst>
+              <a:ext uri="{28A0092B-C50C-407E-A947-70E740481C1C}">
+                <a14:useLocalDpi xmlns:a14="http://schemas.microsoft.com/office/drawing/2010/main" val="0"/>
+              </a:ext>
+            </a:extLst>
+          </a:blip>
+          <a:stretch>
+            <a:fillRect/>
+          </a:stretch>
+        </p:blipFill>
         <p:spPr>
           <a:xfrm>
-            <a:off x="759656" y="2717616"/>
-            <a:ext cx="7469752" cy="1400530"/>
+            <a:off x="1924050" y="1543050"/>
+            <a:ext cx="5200650" cy="5200650"/>
           </a:xfrm>
+          <a:prstGeom prst="rect">
+            <a:avLst/>
+          </a:prstGeom>
         </p:spPr>
-        <p:txBody>
-          <a:bodyPr/>
-          <a:lstStyle/>
-          <a:p>
-            <a:pPr algn="ctr"/>
-            <a:r>
-              <a:rPr lang="en-US" sz="8000" dirty="0" smtClean="0"/>
-              <a:t>Demonstration</a:t>
-            </a:r>
-            <a:endParaRPr lang="en-US" sz="8000" dirty="0"/>
-          </a:p>
-        </p:txBody>
-      </p:sp>
+      </p:pic>
     </p:spTree>
     <p:extLst>
       <p:ext uri="{BB962C8B-B14F-4D97-AF65-F5344CB8AC3E}">
@@ -8358,8 +9347,19 @@
           <a:p>
             <a:r>
               <a:rPr lang="en-US" dirty="0" smtClean="0"/>
-              <a:t>3D/2D Modeling Software</a:t>
-            </a:r>
+              <a:t>3D/2D Modeling </a:t>
+            </a:r>
+            <a:r>
+              <a:rPr lang="en-US" dirty="0" smtClean="0"/>
+              <a:t>Software</a:t>
+            </a:r>
+          </a:p>
+          <a:p>
+            <a:r>
+              <a:rPr lang="en-US" dirty="0" smtClean="0"/>
+              <a:t>Visualized satellite data</a:t>
+            </a:r>
+            <a:endParaRPr lang="en-US" dirty="0" smtClean="0"/>
           </a:p>
           <a:p>
             <a:endParaRPr lang="en-US" dirty="0"/>

</xml_diff>